<commit_message>
Security Risks of GenAI
</commit_message>
<xml_diff>
--- a/Resources/poster.pptx
+++ b/Resources/poster.pptx
@@ -7,10 +7,13 @@
   <p:notesMasterIdLst>
     <p:notesMasterId r:id="rId3"/>
   </p:notesMasterIdLst>
+  <p:handoutMasterIdLst>
+    <p:handoutMasterId r:id="rId4"/>
+  </p:handoutMasterIdLst>
   <p:sldIdLst>
     <p:sldId id="256" r:id="rId2"/>
   </p:sldIdLst>
-  <p:sldSz cx="45720000" cy="32918400"/>
+  <p:sldSz cx="27432000" cy="36576000"/>
   <p:notesSz cx="6858000" cy="9144000"/>
   <p:defaultTextStyle>
     <a:defPPr marL="0" marR="0" indent="0" algn="l" defTabSz="914400" rtl="0" fontAlgn="auto" latinLnBrk="1" hangingPunct="0">
@@ -313,20 +316,239 @@
   <p:extLst>
     <p:ext uri="{EFAFB233-063F-42B5-8137-9DF3F51BA10A}">
       <p15:sldGuideLst xmlns:p15="http://schemas.microsoft.com/office/powerpoint/2012/main">
-        <p15:guide id="1" orient="horz" pos="10368" userDrawn="1">
+        <p15:guide id="1" orient="horz" pos="11520" userDrawn="1">
           <p15:clr>
             <a:srgbClr val="A4A3A4"/>
           </p15:clr>
         </p15:guide>
-        <p15:guide id="2" pos="14400" userDrawn="1">
+        <p15:guide id="2" pos="8640" userDrawn="1">
           <p15:clr>
             <a:srgbClr val="A4A3A4"/>
           </p15:clr>
         </p15:guide>
       </p15:sldGuideLst>
     </p:ext>
+    <p:ext uri="{2D200454-40CA-4A62-9FC3-DE9A4176ACB9}">
+      <p15:notesGuideLst xmlns:p15="http://schemas.microsoft.com/office/powerpoint/2012/main">
+        <p15:guide id="1" orient="horz" pos="2880" userDrawn="1">
+          <p15:clr>
+            <a:srgbClr val="A4A3A4"/>
+          </p15:clr>
+        </p15:guide>
+        <p15:guide id="2" pos="2160" userDrawn="1">
+          <p15:clr>
+            <a:srgbClr val="A4A3A4"/>
+          </p15:clr>
+        </p15:guide>
+      </p15:notesGuideLst>
+    </p:ext>
   </p:extLst>
 </p:presentation>
+</file>
+
+<file path=ppt/handoutMasters/handoutMaster1.xml><?xml version="1.0" encoding="utf-8"?>
+<p:handoutMaster xmlns:a="http://schemas.openxmlformats.org/drawingml/2006/main" xmlns:r="http://schemas.openxmlformats.org/officeDocument/2006/relationships" xmlns:p="http://schemas.openxmlformats.org/presentationml/2006/main">
+  <p:cSld>
+    <p:bg>
+      <p:bgRef idx="1001">
+        <a:schemeClr val="bg1"/>
+      </p:bgRef>
+    </p:bg>
+    <p:spTree>
+      <p:nvGrpSpPr>
+        <p:cNvPr id="1" name=""/>
+        <p:cNvGrpSpPr/>
+        <p:nvPr/>
+      </p:nvGrpSpPr>
+      <p:grpSpPr>
+        <a:xfrm>
+          <a:off x="0" y="0"/>
+          <a:ext cx="0" cy="0"/>
+          <a:chOff x="0" y="0"/>
+          <a:chExt cx="0" cy="0"/>
+        </a:xfrm>
+      </p:grpSpPr>
+      <p:sp>
+        <p:nvSpPr>
+          <p:cNvPr id="2" name="Header Placeholder 1">
+            <a:extLst>
+              <a:ext uri="{FF2B5EF4-FFF2-40B4-BE49-F238E27FC236}">
+                <a16:creationId xmlns:a16="http://schemas.microsoft.com/office/drawing/2014/main" id="{312C400A-74C9-6B56-647B-84A97DDCDBD7}"/>
+              </a:ext>
+            </a:extLst>
+          </p:cNvPr>
+          <p:cNvSpPr>
+            <a:spLocks noGrp="1"/>
+          </p:cNvSpPr>
+          <p:nvPr>
+            <p:ph type="hdr" sz="quarter"/>
+          </p:nvPr>
+        </p:nvSpPr>
+        <p:spPr>
+          <a:xfrm>
+            <a:off x="0" y="0"/>
+            <a:ext cx="2971800" cy="458788"/>
+          </a:xfrm>
+          <a:prstGeom prst="rect">
+            <a:avLst/>
+          </a:prstGeom>
+        </p:spPr>
+        <p:txBody>
+          <a:bodyPr vert="horz" lIns="91440" tIns="45720" rIns="91440" bIns="45720" rtlCol="0"/>
+          <a:lstStyle>
+            <a:lvl1pPr algn="l">
+              <a:defRPr sz="1200"/>
+            </a:lvl1pPr>
+          </a:lstStyle>
+          <a:p>
+            <a:endParaRPr lang="en-US"/>
+          </a:p>
+        </p:txBody>
+      </p:sp>
+      <p:sp>
+        <p:nvSpPr>
+          <p:cNvPr id="3" name="Date Placeholder 2">
+            <a:extLst>
+              <a:ext uri="{FF2B5EF4-FFF2-40B4-BE49-F238E27FC236}">
+                <a16:creationId xmlns:a16="http://schemas.microsoft.com/office/drawing/2014/main" id="{5C363B35-3469-F097-597D-10DF395BE2CB}"/>
+              </a:ext>
+            </a:extLst>
+          </p:cNvPr>
+          <p:cNvSpPr>
+            <a:spLocks noGrp="1"/>
+          </p:cNvSpPr>
+          <p:nvPr>
+            <p:ph type="dt" sz="quarter" idx="1"/>
+          </p:nvPr>
+        </p:nvSpPr>
+        <p:spPr>
+          <a:xfrm>
+            <a:off x="3884613" y="0"/>
+            <a:ext cx="2971800" cy="458788"/>
+          </a:xfrm>
+          <a:prstGeom prst="rect">
+            <a:avLst/>
+          </a:prstGeom>
+        </p:spPr>
+        <p:txBody>
+          <a:bodyPr vert="horz" lIns="91440" tIns="45720" rIns="91440" bIns="45720" rtlCol="0"/>
+          <a:lstStyle>
+            <a:lvl1pPr algn="r">
+              <a:defRPr sz="1200"/>
+            </a:lvl1pPr>
+          </a:lstStyle>
+          <a:p>
+            <a:fld id="{7F74B77C-0ECE-4D48-8FD5-52A5FA0A87BC}" type="datetimeFigureOut">
+              <a:rPr lang="en-US" smtClean="0"/>
+              <a:t>4/11/24</a:t>
+            </a:fld>
+            <a:endParaRPr lang="en-US"/>
+          </a:p>
+        </p:txBody>
+      </p:sp>
+      <p:sp>
+        <p:nvSpPr>
+          <p:cNvPr id="4" name="Footer Placeholder 3">
+            <a:extLst>
+              <a:ext uri="{FF2B5EF4-FFF2-40B4-BE49-F238E27FC236}">
+                <a16:creationId xmlns:a16="http://schemas.microsoft.com/office/drawing/2014/main" id="{F11BE8A9-64E0-BBD2-593E-EE53294FB977}"/>
+              </a:ext>
+            </a:extLst>
+          </p:cNvPr>
+          <p:cNvSpPr>
+            <a:spLocks noGrp="1"/>
+          </p:cNvSpPr>
+          <p:nvPr>
+            <p:ph type="ftr" sz="quarter" idx="2"/>
+          </p:nvPr>
+        </p:nvSpPr>
+        <p:spPr>
+          <a:xfrm>
+            <a:off x="0" y="8685213"/>
+            <a:ext cx="2971800" cy="458787"/>
+          </a:xfrm>
+          <a:prstGeom prst="rect">
+            <a:avLst/>
+          </a:prstGeom>
+        </p:spPr>
+        <p:txBody>
+          <a:bodyPr vert="horz" lIns="91440" tIns="45720" rIns="91440" bIns="45720" rtlCol="0" anchor="b"/>
+          <a:lstStyle>
+            <a:lvl1pPr algn="l">
+              <a:defRPr sz="1200"/>
+            </a:lvl1pPr>
+          </a:lstStyle>
+          <a:p>
+            <a:endParaRPr lang="en-US"/>
+          </a:p>
+        </p:txBody>
+      </p:sp>
+      <p:sp>
+        <p:nvSpPr>
+          <p:cNvPr id="5" name="Slide Number Placeholder 4">
+            <a:extLst>
+              <a:ext uri="{FF2B5EF4-FFF2-40B4-BE49-F238E27FC236}">
+                <a16:creationId xmlns:a16="http://schemas.microsoft.com/office/drawing/2014/main" id="{E869C0E4-9C6A-E952-0F13-1A109F18B4C8}"/>
+              </a:ext>
+            </a:extLst>
+          </p:cNvPr>
+          <p:cNvSpPr>
+            <a:spLocks noGrp="1"/>
+          </p:cNvSpPr>
+          <p:nvPr>
+            <p:ph type="sldNum" sz="quarter" idx="3"/>
+          </p:nvPr>
+        </p:nvSpPr>
+        <p:spPr>
+          <a:xfrm>
+            <a:off x="3884613" y="8685213"/>
+            <a:ext cx="2971800" cy="458787"/>
+          </a:xfrm>
+          <a:prstGeom prst="rect">
+            <a:avLst/>
+          </a:prstGeom>
+        </p:spPr>
+        <p:txBody>
+          <a:bodyPr vert="horz" lIns="91440" tIns="45720" rIns="91440" bIns="45720" rtlCol="0" anchor="b"/>
+          <a:lstStyle>
+            <a:lvl1pPr algn="r">
+              <a:defRPr sz="1200"/>
+            </a:lvl1pPr>
+          </a:lstStyle>
+          <a:p>
+            <a:fld id="{39DE5E1B-B35D-B546-BAF6-60FF235DB5C3}" type="slidenum">
+              <a:rPr lang="en-US" smtClean="0"/>
+              <a:t>‹#›</a:t>
+            </a:fld>
+            <a:endParaRPr lang="en-US"/>
+          </a:p>
+        </p:txBody>
+      </p:sp>
+    </p:spTree>
+    <p:extLst>
+      <p:ext uri="{BB962C8B-B14F-4D97-AF65-F5344CB8AC3E}">
+        <p14:creationId xmlns:p14="http://schemas.microsoft.com/office/powerpoint/2010/main" val="3400392179"/>
+      </p:ext>
+    </p:extLst>
+  </p:cSld>
+  <p:clrMap bg1="lt1" tx1="dk1" bg2="lt2" tx2="dk2" accent1="accent1" accent2="accent2" accent3="accent3" accent4="accent4" accent5="accent5" accent6="accent6" hlink="hlink" folHlink="folHlink"/>
+  <p:extLst>
+    <p:ext uri="{56416CCD-93CA-4268-BC5B-53C4BB910035}">
+      <p15:sldGuideLst xmlns:p15="http://schemas.microsoft.com/office/powerpoint/2012/main">
+        <p15:guide id="1" orient="horz" pos="2880" userDrawn="1">
+          <p15:clr>
+            <a:srgbClr val="F26B43"/>
+          </p15:clr>
+        </p15:guide>
+        <p15:guide id="2" pos="2160" userDrawn="1">
+          <p15:clr>
+            <a:srgbClr val="F26B43"/>
+          </p15:clr>
+        </p15:guide>
+      </p15:sldGuideLst>
+    </p:ext>
+  </p:extLst>
+</p:handoutMaster>
 </file>
 
 <file path=ppt/notesMasters/notesMaster1.xml><?xml version="1.0" encoding="utf-8"?>
@@ -363,8 +585,8 @@
         </p:nvSpPr>
         <p:spPr>
           <a:xfrm>
-            <a:off x="1143000" y="685800"/>
-            <a:ext cx="4572000" cy="3429000"/>
+            <a:off x="2143125" y="685800"/>
+            <a:ext cx="2571750" cy="3429000"/>
           </a:xfrm>
           <a:prstGeom prst="rect">
             <a:avLst/>
@@ -541,8 +763,8 @@
         </p:nvSpPr>
         <p:spPr>
           <a:xfrm>
-            <a:off x="3429663" y="10226675"/>
-            <a:ext cx="38860677" cy="7054850"/>
+            <a:off x="2057798" y="11362971"/>
+            <a:ext cx="23316406" cy="7838723"/>
           </a:xfrm>
           <a:prstGeom prst="rect">
             <a:avLst/>
@@ -570,8 +792,8 @@
         </p:nvSpPr>
         <p:spPr>
           <a:xfrm>
-            <a:off x="6857672" y="18653125"/>
-            <a:ext cx="32004664" cy="8413750"/>
+            <a:off x="4114603" y="20725696"/>
+            <a:ext cx="19202798" cy="9348611"/>
           </a:xfrm>
           <a:prstGeom prst="rect">
             <a:avLst/>
@@ -665,6 +887,1239 @@
 </file>
 
 <file path=ppt/slideLayouts/slideLayout10.xml><?xml version="1.0" encoding="utf-8"?>
+<p:sldLayout xmlns:a="http://schemas.openxmlformats.org/drawingml/2006/main" xmlns:r="http://schemas.openxmlformats.org/officeDocument/2006/relationships" xmlns:p="http://schemas.openxmlformats.org/presentationml/2006/main" type="tx">
+  <p:cSld name="Vertical Title and Text">
+    <p:spTree>
+      <p:nvGrpSpPr>
+        <p:cNvPr id="1" name=""/>
+        <p:cNvGrpSpPr/>
+        <p:nvPr/>
+      </p:nvGrpSpPr>
+      <p:grpSpPr>
+        <a:xfrm>
+          <a:off x="0" y="0"/>
+          <a:ext cx="0" cy="0"/>
+          <a:chOff x="0" y="0"/>
+          <a:chExt cx="0" cy="0"/>
+        </a:xfrm>
+      </p:grpSpPr>
+      <p:sp>
+        <p:nvSpPr>
+          <p:cNvPr id="101" name="Title Text"/>
+          <p:cNvSpPr txBox="1">
+            <a:spLocks noGrp="1"/>
+          </p:cNvSpPr>
+          <p:nvPr>
+            <p:ph type="title"/>
+          </p:nvPr>
+        </p:nvSpPr>
+        <p:spPr>
+          <a:xfrm>
+            <a:off x="19888401" y="1464028"/>
+            <a:ext cx="6172400" cy="31208488"/>
+          </a:xfrm>
+          <a:prstGeom prst="rect">
+            <a:avLst/>
+          </a:prstGeom>
+        </p:spPr>
+        <p:txBody>
+          <a:bodyPr/>
+          <a:lstStyle/>
+          <a:p>
+            <a:r>
+              <a:t>Title Text</a:t>
+            </a:r>
+          </a:p>
+        </p:txBody>
+      </p:sp>
+      <p:sp>
+        <p:nvSpPr>
+          <p:cNvPr id="102" name="Body Level One…"/>
+          <p:cNvSpPr txBox="1">
+            <a:spLocks noGrp="1"/>
+          </p:cNvSpPr>
+          <p:nvPr>
+            <p:ph type="body" idx="1"/>
+          </p:nvPr>
+        </p:nvSpPr>
+        <p:spPr>
+          <a:xfrm>
+            <a:off x="1371204" y="1464028"/>
+            <a:ext cx="18421948" cy="31208488"/>
+          </a:xfrm>
+          <a:prstGeom prst="rect">
+            <a:avLst/>
+          </a:prstGeom>
+        </p:spPr>
+        <p:txBody>
+          <a:bodyPr/>
+          <a:lstStyle>
+            <a:lvl2pPr>
+              <a:buBlip>
+                <a:blip r:embed="rId2"/>
+              </a:buBlip>
+            </a:lvl2pPr>
+            <a:lvl4pPr>
+              <a:buBlip>
+                <a:blip r:embed="rId2"/>
+              </a:buBlip>
+            </a:lvl4pPr>
+            <a:lvl5pPr>
+              <a:buBlip>
+                <a:blip r:embed="rId2"/>
+              </a:buBlip>
+            </a:lvl5pPr>
+          </a:lstStyle>
+          <a:p>
+            <a:r>
+              <a:t>Body Level One</a:t>
+            </a:r>
+          </a:p>
+          <a:p>
+            <a:pPr lvl="1"/>
+            <a:r>
+              <a:t>Body Level Two</a:t>
+            </a:r>
+          </a:p>
+          <a:p>
+            <a:pPr lvl="2"/>
+            <a:r>
+              <a:t>Body Level Three</a:t>
+            </a:r>
+          </a:p>
+          <a:p>
+            <a:pPr lvl="3"/>
+            <a:r>
+              <a:t>Body Level Four</a:t>
+            </a:r>
+          </a:p>
+          <a:p>
+            <a:pPr lvl="4"/>
+            <a:r>
+              <a:t>Body Level Five</a:t>
+            </a:r>
+          </a:p>
+        </p:txBody>
+      </p:sp>
+      <p:sp>
+        <p:nvSpPr>
+          <p:cNvPr id="103" name="Slide Number"/>
+          <p:cNvSpPr txBox="1">
+            <a:spLocks noGrp="1"/>
+          </p:cNvSpPr>
+          <p:nvPr>
+            <p:ph type="sldNum" sz="quarter" idx="2"/>
+          </p:nvPr>
+        </p:nvSpPr>
+        <p:spPr>
+          <a:prstGeom prst="rect">
+            <a:avLst/>
+          </a:prstGeom>
+        </p:spPr>
+        <p:txBody>
+          <a:bodyPr/>
+          <a:lstStyle/>
+          <a:p>
+            <a:fld id="{86CB4B4D-7CA3-9044-876B-883B54F8677D}" type="slidenum">
+              <a:t>‹#›</a:t>
+            </a:fld>
+            <a:endParaRPr/>
+          </a:p>
+        </p:txBody>
+      </p:sp>
+    </p:spTree>
+  </p:cSld>
+  <p:clrMapOvr>
+    <a:masterClrMapping/>
+  </p:clrMapOvr>
+  <p:transition spd="med"/>
+</p:sldLayout>
+</file>
+
+<file path=ppt/slideLayouts/slideLayout2.xml><?xml version="1.0" encoding="utf-8"?>
+<p:sldLayout xmlns:a="http://schemas.openxmlformats.org/drawingml/2006/main" xmlns:r="http://schemas.openxmlformats.org/officeDocument/2006/relationships" xmlns:p="http://schemas.openxmlformats.org/presentationml/2006/main" type="tx">
+  <p:cSld name="Section Header">
+    <p:spTree>
+      <p:nvGrpSpPr>
+        <p:cNvPr id="1" name=""/>
+        <p:cNvGrpSpPr/>
+        <p:nvPr/>
+      </p:nvGrpSpPr>
+      <p:grpSpPr>
+        <a:xfrm>
+          <a:off x="0" y="0"/>
+          <a:ext cx="0" cy="0"/>
+          <a:chOff x="0" y="0"/>
+          <a:chExt cx="0" cy="0"/>
+        </a:xfrm>
+      </p:grpSpPr>
+      <p:sp>
+        <p:nvSpPr>
+          <p:cNvPr id="29" name="Title Text"/>
+          <p:cNvSpPr txBox="1">
+            <a:spLocks noGrp="1"/>
+          </p:cNvSpPr>
+          <p:nvPr>
+            <p:ph type="title"/>
+          </p:nvPr>
+        </p:nvSpPr>
+        <p:spPr>
+          <a:xfrm>
+            <a:off x="2166940" y="23503828"/>
+            <a:ext cx="23317399" cy="7263697"/>
+          </a:xfrm>
+          <a:prstGeom prst="rect">
+            <a:avLst/>
+          </a:prstGeom>
+        </p:spPr>
+        <p:txBody>
+          <a:bodyPr/>
+          <a:lstStyle>
+            <a:lvl1pPr>
+              <a:defRPr sz="4444" cap="all"/>
+            </a:lvl1pPr>
+          </a:lstStyle>
+          <a:p>
+            <a:r>
+              <a:t>Title Text</a:t>
+            </a:r>
+          </a:p>
+        </p:txBody>
+      </p:sp>
+      <p:sp>
+        <p:nvSpPr>
+          <p:cNvPr id="30" name="Body Level One…"/>
+          <p:cNvSpPr txBox="1">
+            <a:spLocks noGrp="1"/>
+          </p:cNvSpPr>
+          <p:nvPr>
+            <p:ph type="body" sz="quarter" idx="1"/>
+          </p:nvPr>
+        </p:nvSpPr>
+        <p:spPr>
+          <a:xfrm>
+            <a:off x="2166940" y="15502820"/>
+            <a:ext cx="23317399" cy="8001002"/>
+          </a:xfrm>
+          <a:prstGeom prst="rect">
+            <a:avLst/>
+          </a:prstGeom>
+        </p:spPr>
+        <p:txBody>
+          <a:bodyPr anchor="b"/>
+          <a:lstStyle>
+            <a:lvl1pPr marL="0" indent="0">
+              <a:spcBef>
+                <a:spcPts val="444"/>
+              </a:spcBef>
+              <a:defRPr sz="2222"/>
+            </a:lvl1pPr>
+            <a:lvl2pPr marL="0" indent="0">
+              <a:spcBef>
+                <a:spcPts val="444"/>
+              </a:spcBef>
+              <a:buSzTx/>
+              <a:buNone/>
+              <a:defRPr sz="2222"/>
+            </a:lvl2pPr>
+            <a:lvl3pPr marL="0" indent="0">
+              <a:spcBef>
+                <a:spcPts val="444"/>
+              </a:spcBef>
+              <a:buSzTx/>
+              <a:buNone/>
+              <a:defRPr sz="2222"/>
+            </a:lvl3pPr>
+            <a:lvl4pPr marL="0" indent="0">
+              <a:spcBef>
+                <a:spcPts val="444"/>
+              </a:spcBef>
+              <a:buSzTx/>
+              <a:buNone/>
+              <a:defRPr sz="2222"/>
+            </a:lvl4pPr>
+            <a:lvl5pPr marL="0" indent="0">
+              <a:spcBef>
+                <a:spcPts val="444"/>
+              </a:spcBef>
+              <a:buSzTx/>
+              <a:buNone/>
+              <a:defRPr sz="2222"/>
+            </a:lvl5pPr>
+          </a:lstStyle>
+          <a:p>
+            <a:r>
+              <a:t>Body Level One</a:t>
+            </a:r>
+          </a:p>
+          <a:p>
+            <a:pPr lvl="1"/>
+            <a:r>
+              <a:t>Body Level Two</a:t>
+            </a:r>
+          </a:p>
+          <a:p>
+            <a:pPr lvl="2"/>
+            <a:r>
+              <a:t>Body Level Three</a:t>
+            </a:r>
+          </a:p>
+          <a:p>
+            <a:pPr lvl="3"/>
+            <a:r>
+              <a:t>Body Level Four</a:t>
+            </a:r>
+          </a:p>
+          <a:p>
+            <a:pPr lvl="4"/>
+            <a:r>
+              <a:t>Body Level Five</a:t>
+            </a:r>
+          </a:p>
+        </p:txBody>
+      </p:sp>
+      <p:sp>
+        <p:nvSpPr>
+          <p:cNvPr id="31" name="Slide Number"/>
+          <p:cNvSpPr txBox="1">
+            <a:spLocks noGrp="1"/>
+          </p:cNvSpPr>
+          <p:nvPr>
+            <p:ph type="sldNum" sz="quarter" idx="2"/>
+          </p:nvPr>
+        </p:nvSpPr>
+        <p:spPr>
+          <a:prstGeom prst="rect">
+            <a:avLst/>
+          </a:prstGeom>
+        </p:spPr>
+        <p:txBody>
+          <a:bodyPr/>
+          <a:lstStyle/>
+          <a:p>
+            <a:fld id="{86CB4B4D-7CA3-9044-876B-883B54F8677D}" type="slidenum">
+              <a:t>‹#›</a:t>
+            </a:fld>
+            <a:endParaRPr/>
+          </a:p>
+        </p:txBody>
+      </p:sp>
+    </p:spTree>
+  </p:cSld>
+  <p:clrMapOvr>
+    <a:masterClrMapping/>
+  </p:clrMapOvr>
+  <p:transition spd="med"/>
+</p:sldLayout>
+</file>
+
+<file path=ppt/slideLayouts/slideLayout3.xml><?xml version="1.0" encoding="utf-8"?>
+<p:sldLayout xmlns:a="http://schemas.openxmlformats.org/drawingml/2006/main" xmlns:r="http://schemas.openxmlformats.org/officeDocument/2006/relationships" xmlns:p="http://schemas.openxmlformats.org/presentationml/2006/main" type="tx">
+  <p:cSld name="Two Content">
+    <p:spTree>
+      <p:nvGrpSpPr>
+        <p:cNvPr id="1" name=""/>
+        <p:cNvGrpSpPr/>
+        <p:nvPr/>
+      </p:nvGrpSpPr>
+      <p:grpSpPr>
+        <a:xfrm>
+          <a:off x="0" y="0"/>
+          <a:ext cx="0" cy="0"/>
+          <a:chOff x="0" y="0"/>
+          <a:chExt cx="0" cy="0"/>
+        </a:xfrm>
+      </p:grpSpPr>
+      <p:sp>
+        <p:nvSpPr>
+          <p:cNvPr id="38" name="Title Text"/>
+          <p:cNvSpPr txBox="1">
+            <a:spLocks noGrp="1"/>
+          </p:cNvSpPr>
+          <p:nvPr>
+            <p:ph type="title"/>
+          </p:nvPr>
+        </p:nvSpPr>
+        <p:spPr>
+          <a:prstGeom prst="rect">
+            <a:avLst/>
+          </a:prstGeom>
+        </p:spPr>
+        <p:txBody>
+          <a:bodyPr/>
+          <a:lstStyle/>
+          <a:p>
+            <a:r>
+              <a:t>Title Text</a:t>
+            </a:r>
+          </a:p>
+        </p:txBody>
+      </p:sp>
+      <p:sp>
+        <p:nvSpPr>
+          <p:cNvPr id="39" name="Body Level One…"/>
+          <p:cNvSpPr txBox="1">
+            <a:spLocks noGrp="1"/>
+          </p:cNvSpPr>
+          <p:nvPr>
+            <p:ph type="body" sz="half" idx="1"/>
+          </p:nvPr>
+        </p:nvSpPr>
+        <p:spPr>
+          <a:xfrm>
+            <a:off x="1371203" y="8533695"/>
+            <a:ext cx="12297172" cy="24138820"/>
+          </a:xfrm>
+          <a:prstGeom prst="rect">
+            <a:avLst/>
+          </a:prstGeom>
+        </p:spPr>
+        <p:txBody>
+          <a:bodyPr/>
+          <a:lstStyle>
+            <a:lvl1pPr>
+              <a:spcBef>
+                <a:spcPts val="667"/>
+              </a:spcBef>
+              <a:defRPr sz="3111"/>
+            </a:lvl1pPr>
+            <a:lvl2pPr marL="1929658" indent="-1777966">
+              <a:spcBef>
+                <a:spcPts val="667"/>
+              </a:spcBef>
+              <a:buBlip>
+                <a:blip r:embed="rId2"/>
+              </a:buBlip>
+              <a:defRPr sz="3111"/>
+            </a:lvl2pPr>
+            <a:lvl3pPr marL="7010619" indent="-2133557">
+              <a:spcBef>
+                <a:spcPts val="667"/>
+              </a:spcBef>
+              <a:defRPr sz="3111"/>
+            </a:lvl3pPr>
+            <a:lvl4pPr marL="9680825" indent="-2367879">
+              <a:spcBef>
+                <a:spcPts val="667"/>
+              </a:spcBef>
+              <a:buBlip>
+                <a:blip r:embed="rId2"/>
+              </a:buBlip>
+              <a:defRPr sz="3111"/>
+            </a:lvl4pPr>
+            <a:lvl5pPr marL="12122001" indent="-2367879">
+              <a:spcBef>
+                <a:spcPts val="667"/>
+              </a:spcBef>
+              <a:buBlip>
+                <a:blip r:embed="rId2"/>
+              </a:buBlip>
+              <a:defRPr sz="3111"/>
+            </a:lvl5pPr>
+          </a:lstStyle>
+          <a:p>
+            <a:r>
+              <a:t>Body Level One</a:t>
+            </a:r>
+          </a:p>
+          <a:p>
+            <a:pPr lvl="1"/>
+            <a:r>
+              <a:t>Body Level Two</a:t>
+            </a:r>
+          </a:p>
+          <a:p>
+            <a:pPr lvl="2"/>
+            <a:r>
+              <a:t>Body Level Three</a:t>
+            </a:r>
+          </a:p>
+          <a:p>
+            <a:pPr lvl="3"/>
+            <a:r>
+              <a:t>Body Level Four</a:t>
+            </a:r>
+          </a:p>
+          <a:p>
+            <a:pPr lvl="4"/>
+            <a:r>
+              <a:t>Body Level Five</a:t>
+            </a:r>
+          </a:p>
+        </p:txBody>
+      </p:sp>
+      <p:sp>
+        <p:nvSpPr>
+          <p:cNvPr id="40" name="Slide Number"/>
+          <p:cNvSpPr txBox="1">
+            <a:spLocks noGrp="1"/>
+          </p:cNvSpPr>
+          <p:nvPr>
+            <p:ph type="sldNum" sz="quarter" idx="2"/>
+          </p:nvPr>
+        </p:nvSpPr>
+        <p:spPr>
+          <a:prstGeom prst="rect">
+            <a:avLst/>
+          </a:prstGeom>
+        </p:spPr>
+        <p:txBody>
+          <a:bodyPr/>
+          <a:lstStyle/>
+          <a:p>
+            <a:fld id="{86CB4B4D-7CA3-9044-876B-883B54F8677D}" type="slidenum">
+              <a:t>‹#›</a:t>
+            </a:fld>
+            <a:endParaRPr/>
+          </a:p>
+        </p:txBody>
+      </p:sp>
+    </p:spTree>
+  </p:cSld>
+  <p:clrMapOvr>
+    <a:masterClrMapping/>
+  </p:clrMapOvr>
+  <p:transition spd="med"/>
+</p:sldLayout>
+</file>
+
+<file path=ppt/slideLayouts/slideLayout4.xml><?xml version="1.0" encoding="utf-8"?>
+<p:sldLayout xmlns:a="http://schemas.openxmlformats.org/drawingml/2006/main" xmlns:r="http://schemas.openxmlformats.org/officeDocument/2006/relationships" xmlns:p="http://schemas.openxmlformats.org/presentationml/2006/main" type="tx">
+  <p:cSld name="Comparison">
+    <p:spTree>
+      <p:nvGrpSpPr>
+        <p:cNvPr id="1" name=""/>
+        <p:cNvGrpSpPr/>
+        <p:nvPr/>
+      </p:nvGrpSpPr>
+      <p:grpSpPr>
+        <a:xfrm>
+          <a:off x="0" y="0"/>
+          <a:ext cx="0" cy="0"/>
+          <a:chOff x="0" y="0"/>
+          <a:chExt cx="0" cy="0"/>
+        </a:xfrm>
+      </p:grpSpPr>
+      <p:sp>
+        <p:nvSpPr>
+          <p:cNvPr id="47" name="Title Text"/>
+          <p:cNvSpPr txBox="1">
+            <a:spLocks noGrp="1"/>
+          </p:cNvSpPr>
+          <p:nvPr>
+            <p:ph type="title"/>
+          </p:nvPr>
+        </p:nvSpPr>
+        <p:spPr>
+          <a:prstGeom prst="rect">
+            <a:avLst/>
+          </a:prstGeom>
+        </p:spPr>
+        <p:txBody>
+          <a:bodyPr/>
+          <a:lstStyle/>
+          <a:p>
+            <a:r>
+              <a:t>Title Text</a:t>
+            </a:r>
+          </a:p>
+        </p:txBody>
+      </p:sp>
+      <p:sp>
+        <p:nvSpPr>
+          <p:cNvPr id="48" name="Body Level One…"/>
+          <p:cNvSpPr txBox="1">
+            <a:spLocks noGrp="1"/>
+          </p:cNvSpPr>
+          <p:nvPr>
+            <p:ph type="body" sz="quarter" idx="1"/>
+          </p:nvPr>
+        </p:nvSpPr>
+        <p:spPr>
+          <a:xfrm>
+            <a:off x="1371204" y="8187977"/>
+            <a:ext cx="12120563" cy="3411363"/>
+          </a:xfrm>
+          <a:prstGeom prst="rect">
+            <a:avLst/>
+          </a:prstGeom>
+        </p:spPr>
+        <p:txBody>
+          <a:bodyPr anchor="b"/>
+          <a:lstStyle>
+            <a:lvl1pPr marL="0" indent="0">
+              <a:spcBef>
+                <a:spcPts val="556"/>
+              </a:spcBef>
+              <a:defRPr sz="2667"/>
+            </a:lvl1pPr>
+            <a:lvl2pPr marL="0" indent="0">
+              <a:spcBef>
+                <a:spcPts val="556"/>
+              </a:spcBef>
+              <a:buSzTx/>
+              <a:buNone/>
+              <a:defRPr sz="2667"/>
+            </a:lvl2pPr>
+            <a:lvl3pPr marL="0" indent="0">
+              <a:spcBef>
+                <a:spcPts val="556"/>
+              </a:spcBef>
+              <a:buSzTx/>
+              <a:buNone/>
+              <a:defRPr sz="2667"/>
+            </a:lvl3pPr>
+            <a:lvl4pPr marL="0" indent="0">
+              <a:spcBef>
+                <a:spcPts val="556"/>
+              </a:spcBef>
+              <a:buSzTx/>
+              <a:buNone/>
+              <a:defRPr sz="2667"/>
+            </a:lvl4pPr>
+            <a:lvl5pPr marL="0" indent="0">
+              <a:spcBef>
+                <a:spcPts val="556"/>
+              </a:spcBef>
+              <a:buSzTx/>
+              <a:buNone/>
+              <a:defRPr sz="2667"/>
+            </a:lvl5pPr>
+          </a:lstStyle>
+          <a:p>
+            <a:r>
+              <a:t>Body Level One</a:t>
+            </a:r>
+          </a:p>
+          <a:p>
+            <a:pPr lvl="1"/>
+            <a:r>
+              <a:t>Body Level Two</a:t>
+            </a:r>
+          </a:p>
+          <a:p>
+            <a:pPr lvl="2"/>
+            <a:r>
+              <a:t>Body Level Three</a:t>
+            </a:r>
+          </a:p>
+          <a:p>
+            <a:pPr lvl="3"/>
+            <a:r>
+              <a:t>Body Level Four</a:t>
+            </a:r>
+          </a:p>
+          <a:p>
+            <a:pPr lvl="4"/>
+            <a:r>
+              <a:t>Body Level Five</a:t>
+            </a:r>
+          </a:p>
+        </p:txBody>
+      </p:sp>
+      <p:sp>
+        <p:nvSpPr>
+          <p:cNvPr id="49" name="Text Placeholder 4"/>
+          <p:cNvSpPr>
+            <a:spLocks noGrp="1"/>
+          </p:cNvSpPr>
+          <p:nvPr>
+            <p:ph type="body" sz="quarter" idx="21"/>
+          </p:nvPr>
+        </p:nvSpPr>
+        <p:spPr>
+          <a:xfrm>
+            <a:off x="13935277" y="8187977"/>
+            <a:ext cx="12125523" cy="3411363"/>
+          </a:xfrm>
+          <a:prstGeom prst="rect">
+            <a:avLst/>
+          </a:prstGeom>
+        </p:spPr>
+        <p:txBody>
+          <a:bodyPr anchor="b"/>
+          <a:lstStyle/>
+          <a:p>
+            <a:endParaRPr/>
+          </a:p>
+        </p:txBody>
+      </p:sp>
+      <p:sp>
+        <p:nvSpPr>
+          <p:cNvPr id="50" name="Slide Number"/>
+          <p:cNvSpPr txBox="1">
+            <a:spLocks noGrp="1"/>
+          </p:cNvSpPr>
+          <p:nvPr>
+            <p:ph type="sldNum" sz="quarter" idx="2"/>
+          </p:nvPr>
+        </p:nvSpPr>
+        <p:spPr>
+          <a:prstGeom prst="rect">
+            <a:avLst/>
+          </a:prstGeom>
+        </p:spPr>
+        <p:txBody>
+          <a:bodyPr/>
+          <a:lstStyle/>
+          <a:p>
+            <a:fld id="{86CB4B4D-7CA3-9044-876B-883B54F8677D}" type="slidenum">
+              <a:t>‹#›</a:t>
+            </a:fld>
+            <a:endParaRPr/>
+          </a:p>
+        </p:txBody>
+      </p:sp>
+    </p:spTree>
+  </p:cSld>
+  <p:clrMapOvr>
+    <a:masterClrMapping/>
+  </p:clrMapOvr>
+  <p:transition spd="med"/>
+</p:sldLayout>
+</file>
+
+<file path=ppt/slideLayouts/slideLayout5.xml><?xml version="1.0" encoding="utf-8"?>
+<p:sldLayout xmlns:a="http://schemas.openxmlformats.org/drawingml/2006/main" xmlns:r="http://schemas.openxmlformats.org/officeDocument/2006/relationships" xmlns:p="http://schemas.openxmlformats.org/presentationml/2006/main" type="tx">
+  <p:cSld name="Title Only">
+    <p:spTree>
+      <p:nvGrpSpPr>
+        <p:cNvPr id="1" name=""/>
+        <p:cNvGrpSpPr/>
+        <p:nvPr/>
+      </p:nvGrpSpPr>
+      <p:grpSpPr>
+        <a:xfrm>
+          <a:off x="0" y="0"/>
+          <a:ext cx="0" cy="0"/>
+          <a:chOff x="0" y="0"/>
+          <a:chExt cx="0" cy="0"/>
+        </a:xfrm>
+      </p:grpSpPr>
+      <p:sp>
+        <p:nvSpPr>
+          <p:cNvPr id="57" name="Title Text"/>
+          <p:cNvSpPr txBox="1">
+            <a:spLocks noGrp="1"/>
+          </p:cNvSpPr>
+          <p:nvPr>
+            <p:ph type="title"/>
+          </p:nvPr>
+        </p:nvSpPr>
+        <p:spPr>
+          <a:prstGeom prst="rect">
+            <a:avLst/>
+          </a:prstGeom>
+        </p:spPr>
+        <p:txBody>
+          <a:bodyPr/>
+          <a:lstStyle/>
+          <a:p>
+            <a:r>
+              <a:t>Title Text</a:t>
+            </a:r>
+          </a:p>
+        </p:txBody>
+      </p:sp>
+      <p:sp>
+        <p:nvSpPr>
+          <p:cNvPr id="58" name="Slide Number"/>
+          <p:cNvSpPr txBox="1">
+            <a:spLocks noGrp="1"/>
+          </p:cNvSpPr>
+          <p:nvPr>
+            <p:ph type="sldNum" sz="quarter" idx="2"/>
+          </p:nvPr>
+        </p:nvSpPr>
+        <p:spPr>
+          <a:prstGeom prst="rect">
+            <a:avLst/>
+          </a:prstGeom>
+        </p:spPr>
+        <p:txBody>
+          <a:bodyPr/>
+          <a:lstStyle/>
+          <a:p>
+            <a:fld id="{86CB4B4D-7CA3-9044-876B-883B54F8677D}" type="slidenum">
+              <a:t>‹#›</a:t>
+            </a:fld>
+            <a:endParaRPr/>
+          </a:p>
+        </p:txBody>
+      </p:sp>
+    </p:spTree>
+  </p:cSld>
+  <p:clrMapOvr>
+    <a:masterClrMapping/>
+  </p:clrMapOvr>
+  <p:transition spd="med"/>
+</p:sldLayout>
+</file>
+
+<file path=ppt/slideLayouts/slideLayout6.xml><?xml version="1.0" encoding="utf-8"?>
+<p:sldLayout xmlns:a="http://schemas.openxmlformats.org/drawingml/2006/main" xmlns:r="http://schemas.openxmlformats.org/officeDocument/2006/relationships" xmlns:p="http://schemas.openxmlformats.org/presentationml/2006/main" type="tx">
+  <p:cSld name="Blank">
+    <p:spTree>
+      <p:nvGrpSpPr>
+        <p:cNvPr id="1" name=""/>
+        <p:cNvGrpSpPr/>
+        <p:nvPr/>
+      </p:nvGrpSpPr>
+      <p:grpSpPr>
+        <a:xfrm>
+          <a:off x="0" y="0"/>
+          <a:ext cx="0" cy="0"/>
+          <a:chOff x="0" y="0"/>
+          <a:chExt cx="0" cy="0"/>
+        </a:xfrm>
+      </p:grpSpPr>
+      <p:sp>
+        <p:nvSpPr>
+          <p:cNvPr id="65" name="Slide Number"/>
+          <p:cNvSpPr txBox="1">
+            <a:spLocks noGrp="1"/>
+          </p:cNvSpPr>
+          <p:nvPr>
+            <p:ph type="sldNum" sz="quarter" idx="2"/>
+          </p:nvPr>
+        </p:nvSpPr>
+        <p:spPr>
+          <a:prstGeom prst="rect">
+            <a:avLst/>
+          </a:prstGeom>
+        </p:spPr>
+        <p:txBody>
+          <a:bodyPr/>
+          <a:lstStyle/>
+          <a:p>
+            <a:fld id="{86CB4B4D-7CA3-9044-876B-883B54F8677D}" type="slidenum">
+              <a:t>‹#›</a:t>
+            </a:fld>
+            <a:endParaRPr/>
+          </a:p>
+        </p:txBody>
+      </p:sp>
+    </p:spTree>
+  </p:cSld>
+  <p:clrMapOvr>
+    <a:masterClrMapping/>
+  </p:clrMapOvr>
+  <p:transition spd="med"/>
+</p:sldLayout>
+</file>
+
+<file path=ppt/slideLayouts/slideLayout7.xml><?xml version="1.0" encoding="utf-8"?>
+<p:sldLayout xmlns:a="http://schemas.openxmlformats.org/drawingml/2006/main" xmlns:r="http://schemas.openxmlformats.org/officeDocument/2006/relationships" xmlns:p="http://schemas.openxmlformats.org/presentationml/2006/main" type="tx">
+  <p:cSld name="Content with Caption">
+    <p:spTree>
+      <p:nvGrpSpPr>
+        <p:cNvPr id="1" name=""/>
+        <p:cNvGrpSpPr/>
+        <p:nvPr/>
+      </p:nvGrpSpPr>
+      <p:grpSpPr>
+        <a:xfrm>
+          <a:off x="0" y="0"/>
+          <a:ext cx="0" cy="0"/>
+          <a:chOff x="0" y="0"/>
+          <a:chExt cx="0" cy="0"/>
+        </a:xfrm>
+      </p:grpSpPr>
+      <p:sp>
+        <p:nvSpPr>
+          <p:cNvPr id="72" name="Title Text"/>
+          <p:cNvSpPr txBox="1">
+            <a:spLocks noGrp="1"/>
+          </p:cNvSpPr>
+          <p:nvPr>
+            <p:ph type="title"/>
+          </p:nvPr>
+        </p:nvSpPr>
+        <p:spPr>
+          <a:xfrm>
+            <a:off x="1371203" y="1456972"/>
+            <a:ext cx="9024938" cy="6196542"/>
+          </a:xfrm>
+          <a:prstGeom prst="rect">
+            <a:avLst/>
+          </a:prstGeom>
+        </p:spPr>
+        <p:txBody>
+          <a:bodyPr anchor="b"/>
+          <a:lstStyle>
+            <a:lvl1pPr>
+              <a:defRPr sz="2222"/>
+            </a:lvl1pPr>
+          </a:lstStyle>
+          <a:p>
+            <a:r>
+              <a:t>Title Text</a:t>
+            </a:r>
+          </a:p>
+        </p:txBody>
+      </p:sp>
+      <p:sp>
+        <p:nvSpPr>
+          <p:cNvPr id="73" name="Body Level One…"/>
+          <p:cNvSpPr txBox="1">
+            <a:spLocks noGrp="1"/>
+          </p:cNvSpPr>
+          <p:nvPr>
+            <p:ph type="body" idx="1"/>
+          </p:nvPr>
+        </p:nvSpPr>
+        <p:spPr>
+          <a:xfrm>
+            <a:off x="10725546" y="1456973"/>
+            <a:ext cx="15335251" cy="31215542"/>
+          </a:xfrm>
+          <a:prstGeom prst="rect">
+            <a:avLst/>
+          </a:prstGeom>
+        </p:spPr>
+        <p:txBody>
+          <a:bodyPr/>
+          <a:lstStyle>
+            <a:lvl1pPr>
+              <a:spcBef>
+                <a:spcPts val="778"/>
+              </a:spcBef>
+              <a:defRPr sz="3556"/>
+            </a:lvl1pPr>
+            <a:lvl2pPr marL="1893371" indent="-1741681">
+              <a:spcBef>
+                <a:spcPts val="778"/>
+              </a:spcBef>
+              <a:buBlip>
+                <a:blip r:embed="rId2"/>
+              </a:buBlip>
+              <a:defRPr sz="3556"/>
+            </a:lvl2pPr>
+            <a:lvl3pPr marL="6909022" indent="-2031962">
+              <a:spcBef>
+                <a:spcPts val="778"/>
+              </a:spcBef>
+              <a:defRPr sz="3556"/>
+            </a:lvl3pPr>
+            <a:lvl4pPr marL="9748479" indent="-2435534">
+              <a:spcBef>
+                <a:spcPts val="778"/>
+              </a:spcBef>
+              <a:buBlip>
+                <a:blip r:embed="rId2"/>
+              </a:buBlip>
+              <a:defRPr sz="3556"/>
+            </a:lvl4pPr>
+            <a:lvl5pPr marL="12189656" indent="-2435534">
+              <a:spcBef>
+                <a:spcPts val="778"/>
+              </a:spcBef>
+              <a:buBlip>
+                <a:blip r:embed="rId2"/>
+              </a:buBlip>
+              <a:defRPr sz="3556"/>
+            </a:lvl5pPr>
+          </a:lstStyle>
+          <a:p>
+            <a:r>
+              <a:t>Body Level One</a:t>
+            </a:r>
+          </a:p>
+          <a:p>
+            <a:pPr lvl="1"/>
+            <a:r>
+              <a:t>Body Level Two</a:t>
+            </a:r>
+          </a:p>
+          <a:p>
+            <a:pPr lvl="2"/>
+            <a:r>
+              <a:t>Body Level Three</a:t>
+            </a:r>
+          </a:p>
+          <a:p>
+            <a:pPr lvl="3"/>
+            <a:r>
+              <a:t>Body Level Four</a:t>
+            </a:r>
+          </a:p>
+          <a:p>
+            <a:pPr lvl="4"/>
+            <a:r>
+              <a:t>Body Level Five</a:t>
+            </a:r>
+          </a:p>
+        </p:txBody>
+      </p:sp>
+      <p:sp>
+        <p:nvSpPr>
+          <p:cNvPr id="74" name="Text Placeholder 3"/>
+          <p:cNvSpPr>
+            <a:spLocks noGrp="1"/>
+          </p:cNvSpPr>
+          <p:nvPr>
+            <p:ph type="body" sz="half" idx="21"/>
+          </p:nvPr>
+        </p:nvSpPr>
+        <p:spPr>
+          <a:xfrm>
+            <a:off x="1371204" y="7653514"/>
+            <a:ext cx="9024939" cy="25019004"/>
+          </a:xfrm>
+          <a:prstGeom prst="rect">
+            <a:avLst/>
+          </a:prstGeom>
+        </p:spPr>
+        <p:txBody>
+          <a:bodyPr/>
+          <a:lstStyle/>
+          <a:p>
+            <a:endParaRPr/>
+          </a:p>
+        </p:txBody>
+      </p:sp>
+      <p:sp>
+        <p:nvSpPr>
+          <p:cNvPr id="75" name="Slide Number"/>
+          <p:cNvSpPr txBox="1">
+            <a:spLocks noGrp="1"/>
+          </p:cNvSpPr>
+          <p:nvPr>
+            <p:ph type="sldNum" sz="quarter" idx="2"/>
+          </p:nvPr>
+        </p:nvSpPr>
+        <p:spPr>
+          <a:prstGeom prst="rect">
+            <a:avLst/>
+          </a:prstGeom>
+        </p:spPr>
+        <p:txBody>
+          <a:bodyPr/>
+          <a:lstStyle/>
+          <a:p>
+            <a:fld id="{86CB4B4D-7CA3-9044-876B-883B54F8677D}" type="slidenum">
+              <a:t>‹#›</a:t>
+            </a:fld>
+            <a:endParaRPr/>
+          </a:p>
+        </p:txBody>
+      </p:sp>
+    </p:spTree>
+  </p:cSld>
+  <p:clrMapOvr>
+    <a:masterClrMapping/>
+  </p:clrMapOvr>
+  <p:transition spd="med"/>
+</p:sldLayout>
+</file>
+
+<file path=ppt/slideLayouts/slideLayout8.xml><?xml version="1.0" encoding="utf-8"?>
+<p:sldLayout xmlns:a="http://schemas.openxmlformats.org/drawingml/2006/main" xmlns:r="http://schemas.openxmlformats.org/officeDocument/2006/relationships" xmlns:p="http://schemas.openxmlformats.org/presentationml/2006/main" type="tx">
+  <p:cSld name="Picture with Caption">
+    <p:spTree>
+      <p:nvGrpSpPr>
+        <p:cNvPr id="1" name=""/>
+        <p:cNvGrpSpPr/>
+        <p:nvPr/>
+      </p:nvGrpSpPr>
+      <p:grpSpPr>
+        <a:xfrm>
+          <a:off x="0" y="0"/>
+          <a:ext cx="0" cy="0"/>
+          <a:chOff x="0" y="0"/>
+          <a:chExt cx="0" cy="0"/>
+        </a:xfrm>
+      </p:grpSpPr>
+      <p:sp>
+        <p:nvSpPr>
+          <p:cNvPr id="82" name="Title Text"/>
+          <p:cNvSpPr txBox="1">
+            <a:spLocks noGrp="1"/>
+          </p:cNvSpPr>
+          <p:nvPr>
+            <p:ph type="title"/>
+          </p:nvPr>
+        </p:nvSpPr>
+        <p:spPr>
+          <a:xfrm>
+            <a:off x="5376665" y="25602855"/>
+            <a:ext cx="16459398" cy="3023308"/>
+          </a:xfrm>
+          <a:prstGeom prst="rect">
+            <a:avLst/>
+          </a:prstGeom>
+        </p:spPr>
+        <p:txBody>
+          <a:bodyPr anchor="b"/>
+          <a:lstStyle>
+            <a:lvl1pPr>
+              <a:defRPr sz="2222"/>
+            </a:lvl1pPr>
+          </a:lstStyle>
+          <a:p>
+            <a:r>
+              <a:t>Title Text</a:t>
+            </a:r>
+          </a:p>
+        </p:txBody>
+      </p:sp>
+      <p:sp>
+        <p:nvSpPr>
+          <p:cNvPr id="83" name="Picture Placeholder 2"/>
+          <p:cNvSpPr>
+            <a:spLocks noGrp="1"/>
+          </p:cNvSpPr>
+          <p:nvPr>
+            <p:ph type="pic" sz="half" idx="21"/>
+          </p:nvPr>
+        </p:nvSpPr>
+        <p:spPr>
+          <a:xfrm>
+            <a:off x="5376665" y="3268490"/>
+            <a:ext cx="16459398" cy="21944546"/>
+          </a:xfrm>
+          <a:prstGeom prst="rect">
+            <a:avLst/>
+          </a:prstGeom>
+        </p:spPr>
+        <p:txBody>
+          <a:bodyPr lIns="91439" tIns="45719" rIns="91439" bIns="45719">
+            <a:noAutofit/>
+          </a:bodyPr>
+          <a:lstStyle/>
+          <a:p>
+            <a:endParaRPr/>
+          </a:p>
+        </p:txBody>
+      </p:sp>
+      <p:sp>
+        <p:nvSpPr>
+          <p:cNvPr id="84" name="Body Level One…"/>
+          <p:cNvSpPr txBox="1">
+            <a:spLocks noGrp="1"/>
+          </p:cNvSpPr>
+          <p:nvPr>
+            <p:ph type="body" sz="quarter" idx="1"/>
+          </p:nvPr>
+        </p:nvSpPr>
+        <p:spPr>
+          <a:xfrm>
+            <a:off x="5376665" y="28626160"/>
+            <a:ext cx="16459398" cy="4291543"/>
+          </a:xfrm>
+          <a:prstGeom prst="rect">
+            <a:avLst/>
+          </a:prstGeom>
+        </p:spPr>
+        <p:txBody>
+          <a:bodyPr/>
+          <a:lstStyle>
+            <a:lvl1pPr marL="0" indent="0">
+              <a:spcBef>
+                <a:spcPts val="333"/>
+              </a:spcBef>
+              <a:defRPr sz="1556"/>
+            </a:lvl1pPr>
+            <a:lvl2pPr marL="0" indent="0">
+              <a:spcBef>
+                <a:spcPts val="333"/>
+              </a:spcBef>
+              <a:buSzTx/>
+              <a:buNone/>
+              <a:defRPr sz="1556"/>
+            </a:lvl2pPr>
+            <a:lvl3pPr marL="0" indent="0">
+              <a:spcBef>
+                <a:spcPts val="333"/>
+              </a:spcBef>
+              <a:buSzTx/>
+              <a:buNone/>
+              <a:defRPr sz="1556"/>
+            </a:lvl3pPr>
+            <a:lvl4pPr marL="0" indent="0">
+              <a:spcBef>
+                <a:spcPts val="333"/>
+              </a:spcBef>
+              <a:buSzTx/>
+              <a:buNone/>
+              <a:defRPr sz="1556"/>
+            </a:lvl4pPr>
+            <a:lvl5pPr marL="0" indent="0">
+              <a:spcBef>
+                <a:spcPts val="333"/>
+              </a:spcBef>
+              <a:buSzTx/>
+              <a:buNone/>
+              <a:defRPr sz="1556"/>
+            </a:lvl5pPr>
+          </a:lstStyle>
+          <a:p>
+            <a:r>
+              <a:t>Body Level One</a:t>
+            </a:r>
+          </a:p>
+          <a:p>
+            <a:pPr lvl="1"/>
+            <a:r>
+              <a:t>Body Level Two</a:t>
+            </a:r>
+          </a:p>
+          <a:p>
+            <a:pPr lvl="2"/>
+            <a:r>
+              <a:t>Body Level Three</a:t>
+            </a:r>
+          </a:p>
+          <a:p>
+            <a:pPr lvl="3"/>
+            <a:r>
+              <a:t>Body Level Four</a:t>
+            </a:r>
+          </a:p>
+          <a:p>
+            <a:pPr lvl="4"/>
+            <a:r>
+              <a:t>Body Level Five</a:t>
+            </a:r>
+          </a:p>
+        </p:txBody>
+      </p:sp>
+      <p:sp>
+        <p:nvSpPr>
+          <p:cNvPr id="85" name="Slide Number"/>
+          <p:cNvSpPr txBox="1">
+            <a:spLocks noGrp="1"/>
+          </p:cNvSpPr>
+          <p:nvPr>
+            <p:ph type="sldNum" sz="quarter" idx="2"/>
+          </p:nvPr>
+        </p:nvSpPr>
+        <p:spPr>
+          <a:prstGeom prst="rect">
+            <a:avLst/>
+          </a:prstGeom>
+        </p:spPr>
+        <p:txBody>
+          <a:bodyPr/>
+          <a:lstStyle/>
+          <a:p>
+            <a:fld id="{86CB4B4D-7CA3-9044-876B-883B54F8677D}" type="slidenum">
+              <a:t>‹#›</a:t>
+            </a:fld>
+            <a:endParaRPr/>
+          </a:p>
+        </p:txBody>
+      </p:sp>
+    </p:spTree>
+  </p:cSld>
+  <p:clrMapOvr>
+    <a:masterClrMapping/>
+  </p:clrMapOvr>
+  <p:transition spd="med"/>
+</p:sldLayout>
+</file>
+
+<file path=ppt/slideLayouts/slideLayout9.xml><?xml version="1.0" encoding="utf-8"?>
 <p:sldLayout xmlns:a="http://schemas.openxmlformats.org/drawingml/2006/main" xmlns:r="http://schemas.openxmlformats.org/officeDocument/2006/relationships" xmlns:p="http://schemas.openxmlformats.org/presentationml/2006/main" type="tx">
   <p:cSld name="Title and Vertical Text">
     <p:spTree>
@@ -806,1391 +2261,13 @@
 </p:sldLayout>
 </file>
 
-<file path=ppt/slideLayouts/slideLayout11.xml><?xml version="1.0" encoding="utf-8"?>
-<p:sldLayout xmlns:a="http://schemas.openxmlformats.org/drawingml/2006/main" xmlns:r="http://schemas.openxmlformats.org/officeDocument/2006/relationships" xmlns:p="http://schemas.openxmlformats.org/presentationml/2006/main" type="tx">
-  <p:cSld name="Vertical Title and Text">
-    <p:spTree>
-      <p:nvGrpSpPr>
-        <p:cNvPr id="1" name=""/>
-        <p:cNvGrpSpPr/>
-        <p:nvPr/>
-      </p:nvGrpSpPr>
-      <p:grpSpPr>
-        <a:xfrm>
-          <a:off x="0" y="0"/>
-          <a:ext cx="0" cy="0"/>
-          <a:chOff x="0" y="0"/>
-          <a:chExt cx="0" cy="0"/>
-        </a:xfrm>
-      </p:grpSpPr>
-      <p:sp>
-        <p:nvSpPr>
-          <p:cNvPr id="101" name="Title Text"/>
-          <p:cNvSpPr txBox="1">
-            <a:spLocks noGrp="1"/>
-          </p:cNvSpPr>
-          <p:nvPr>
-            <p:ph type="title"/>
-          </p:nvPr>
-        </p:nvSpPr>
-        <p:spPr>
-          <a:xfrm>
-            <a:off x="33147334" y="1317625"/>
-            <a:ext cx="10287333" cy="28087638"/>
-          </a:xfrm>
-          <a:prstGeom prst="rect">
-            <a:avLst/>
-          </a:prstGeom>
-        </p:spPr>
-        <p:txBody>
-          <a:bodyPr/>
-          <a:lstStyle/>
-          <a:p>
-            <a:r>
-              <a:t>Title Text</a:t>
-            </a:r>
-          </a:p>
-        </p:txBody>
-      </p:sp>
-      <p:sp>
-        <p:nvSpPr>
-          <p:cNvPr id="102" name="Body Level One…"/>
-          <p:cNvSpPr txBox="1">
-            <a:spLocks noGrp="1"/>
-          </p:cNvSpPr>
-          <p:nvPr>
-            <p:ph type="body" idx="1"/>
-          </p:nvPr>
-        </p:nvSpPr>
-        <p:spPr>
-          <a:xfrm>
-            <a:off x="2285339" y="1317625"/>
-            <a:ext cx="30703247" cy="28087638"/>
-          </a:xfrm>
-          <a:prstGeom prst="rect">
-            <a:avLst/>
-          </a:prstGeom>
-        </p:spPr>
-        <p:txBody>
-          <a:bodyPr/>
-          <a:lstStyle>
-            <a:lvl2pPr>
-              <a:buBlip>
-                <a:blip r:embed="rId2"/>
-              </a:buBlip>
-            </a:lvl2pPr>
-            <a:lvl4pPr>
-              <a:buBlip>
-                <a:blip r:embed="rId2"/>
-              </a:buBlip>
-            </a:lvl4pPr>
-            <a:lvl5pPr>
-              <a:buBlip>
-                <a:blip r:embed="rId2"/>
-              </a:buBlip>
-            </a:lvl5pPr>
-          </a:lstStyle>
-          <a:p>
-            <a:r>
-              <a:t>Body Level One</a:t>
-            </a:r>
-          </a:p>
-          <a:p>
-            <a:pPr lvl="1"/>
-            <a:r>
-              <a:t>Body Level Two</a:t>
-            </a:r>
-          </a:p>
-          <a:p>
-            <a:pPr lvl="2"/>
-            <a:r>
-              <a:t>Body Level Three</a:t>
-            </a:r>
-          </a:p>
-          <a:p>
-            <a:pPr lvl="3"/>
-            <a:r>
-              <a:t>Body Level Four</a:t>
-            </a:r>
-          </a:p>
-          <a:p>
-            <a:pPr lvl="4"/>
-            <a:r>
-              <a:t>Body Level Five</a:t>
-            </a:r>
-          </a:p>
-        </p:txBody>
-      </p:sp>
-      <p:sp>
-        <p:nvSpPr>
-          <p:cNvPr id="103" name="Slide Number"/>
-          <p:cNvSpPr txBox="1">
-            <a:spLocks noGrp="1"/>
-          </p:cNvSpPr>
-          <p:nvPr>
-            <p:ph type="sldNum" sz="quarter" idx="2"/>
-          </p:nvPr>
-        </p:nvSpPr>
-        <p:spPr>
-          <a:prstGeom prst="rect">
-            <a:avLst/>
-          </a:prstGeom>
-        </p:spPr>
-        <p:txBody>
-          <a:bodyPr/>
-          <a:lstStyle/>
-          <a:p>
-            <a:fld id="{86CB4B4D-7CA3-9044-876B-883B54F8677D}" type="slidenum">
-              <a:t>‹#›</a:t>
-            </a:fld>
-            <a:endParaRPr/>
-          </a:p>
-        </p:txBody>
-      </p:sp>
-    </p:spTree>
-  </p:cSld>
-  <p:clrMapOvr>
-    <a:masterClrMapping/>
-  </p:clrMapOvr>
-  <p:transition spd="med"/>
-</p:sldLayout>
-</file>
-
-<file path=ppt/slideLayouts/slideLayout2.xml><?xml version="1.0" encoding="utf-8"?>
-<p:sldLayout xmlns:a="http://schemas.openxmlformats.org/drawingml/2006/main" xmlns:r="http://schemas.openxmlformats.org/officeDocument/2006/relationships" xmlns:p="http://schemas.openxmlformats.org/presentationml/2006/main" type="tx">
-  <p:cSld name="Title and Content">
-    <p:spTree>
-      <p:nvGrpSpPr>
-        <p:cNvPr id="1" name=""/>
-        <p:cNvGrpSpPr/>
-        <p:nvPr/>
-      </p:nvGrpSpPr>
-      <p:grpSpPr>
-        <a:xfrm>
-          <a:off x="0" y="0"/>
-          <a:ext cx="0" cy="0"/>
-          <a:chOff x="0" y="0"/>
-          <a:chExt cx="0" cy="0"/>
-        </a:xfrm>
-      </p:grpSpPr>
-      <p:sp>
-        <p:nvSpPr>
-          <p:cNvPr id="20" name="Title Text"/>
-          <p:cNvSpPr txBox="1">
-            <a:spLocks noGrp="1"/>
-          </p:cNvSpPr>
-          <p:nvPr>
-            <p:ph type="title"/>
-          </p:nvPr>
-        </p:nvSpPr>
-        <p:spPr>
-          <a:prstGeom prst="rect">
-            <a:avLst/>
-          </a:prstGeom>
-        </p:spPr>
-        <p:txBody>
-          <a:bodyPr/>
-          <a:lstStyle/>
-          <a:p>
-            <a:r>
-              <a:t>Title Text</a:t>
-            </a:r>
-          </a:p>
-        </p:txBody>
-      </p:sp>
-      <p:sp>
-        <p:nvSpPr>
-          <p:cNvPr id="21" name="Body Level One…"/>
-          <p:cNvSpPr txBox="1">
-            <a:spLocks noGrp="1"/>
-          </p:cNvSpPr>
-          <p:nvPr>
-            <p:ph type="body" idx="1"/>
-          </p:nvPr>
-        </p:nvSpPr>
-        <p:spPr>
-          <a:prstGeom prst="rect">
-            <a:avLst/>
-          </a:prstGeom>
-        </p:spPr>
-        <p:txBody>
-          <a:bodyPr/>
-          <a:lstStyle>
-            <a:lvl2pPr>
-              <a:buBlip>
-                <a:blip r:embed="rId2"/>
-              </a:buBlip>
-            </a:lvl2pPr>
-            <a:lvl4pPr>
-              <a:buBlip>
-                <a:blip r:embed="rId2"/>
-              </a:buBlip>
-            </a:lvl4pPr>
-            <a:lvl5pPr>
-              <a:buBlip>
-                <a:blip r:embed="rId2"/>
-              </a:buBlip>
-            </a:lvl5pPr>
-          </a:lstStyle>
-          <a:p>
-            <a:r>
-              <a:t>Body Level One</a:t>
-            </a:r>
-          </a:p>
-          <a:p>
-            <a:pPr lvl="1"/>
-            <a:r>
-              <a:t>Body Level Two</a:t>
-            </a:r>
-          </a:p>
-          <a:p>
-            <a:pPr lvl="2"/>
-            <a:r>
-              <a:t>Body Level Three</a:t>
-            </a:r>
-          </a:p>
-          <a:p>
-            <a:pPr lvl="3"/>
-            <a:r>
-              <a:t>Body Level Four</a:t>
-            </a:r>
-          </a:p>
-          <a:p>
-            <a:pPr lvl="4"/>
-            <a:r>
-              <a:t>Body Level Five</a:t>
-            </a:r>
-          </a:p>
-        </p:txBody>
-      </p:sp>
-      <p:sp>
-        <p:nvSpPr>
-          <p:cNvPr id="22" name="Slide Number"/>
-          <p:cNvSpPr txBox="1">
-            <a:spLocks noGrp="1"/>
-          </p:cNvSpPr>
-          <p:nvPr>
-            <p:ph type="sldNum" sz="quarter" idx="2"/>
-          </p:nvPr>
-        </p:nvSpPr>
-        <p:spPr>
-          <a:prstGeom prst="rect">
-            <a:avLst/>
-          </a:prstGeom>
-        </p:spPr>
-        <p:txBody>
-          <a:bodyPr/>
-          <a:lstStyle/>
-          <a:p>
-            <a:fld id="{86CB4B4D-7CA3-9044-876B-883B54F8677D}" type="slidenum">
-              <a:t>‹#›</a:t>
-            </a:fld>
-            <a:endParaRPr/>
-          </a:p>
-        </p:txBody>
-      </p:sp>
-    </p:spTree>
-  </p:cSld>
-  <p:clrMapOvr>
-    <a:masterClrMapping/>
-  </p:clrMapOvr>
-  <p:transition spd="med"/>
-</p:sldLayout>
-</file>
-
-<file path=ppt/slideLayouts/slideLayout3.xml><?xml version="1.0" encoding="utf-8"?>
-<p:sldLayout xmlns:a="http://schemas.openxmlformats.org/drawingml/2006/main" xmlns:r="http://schemas.openxmlformats.org/officeDocument/2006/relationships" xmlns:p="http://schemas.openxmlformats.org/presentationml/2006/main" type="tx">
-  <p:cSld name="Section Header">
-    <p:spTree>
-      <p:nvGrpSpPr>
-        <p:cNvPr id="1" name=""/>
-        <p:cNvGrpSpPr/>
-        <p:nvPr/>
-      </p:nvGrpSpPr>
-      <p:grpSpPr>
-        <a:xfrm>
-          <a:off x="0" y="0"/>
-          <a:ext cx="0" cy="0"/>
-          <a:chOff x="0" y="0"/>
-          <a:chExt cx="0" cy="0"/>
-        </a:xfrm>
-      </p:grpSpPr>
-      <p:sp>
-        <p:nvSpPr>
-          <p:cNvPr id="29" name="Title Text"/>
-          <p:cNvSpPr txBox="1">
-            <a:spLocks noGrp="1"/>
-          </p:cNvSpPr>
-          <p:nvPr>
-            <p:ph type="title"/>
-          </p:nvPr>
-        </p:nvSpPr>
-        <p:spPr>
-          <a:xfrm>
-            <a:off x="3611564" y="21153443"/>
-            <a:ext cx="38862332" cy="6537327"/>
-          </a:xfrm>
-          <a:prstGeom prst="rect">
-            <a:avLst/>
-          </a:prstGeom>
-        </p:spPr>
-        <p:txBody>
-          <a:bodyPr/>
-          <a:lstStyle>
-            <a:lvl1pPr>
-              <a:defRPr sz="4000" cap="all"/>
-            </a:lvl1pPr>
-          </a:lstStyle>
-          <a:p>
-            <a:r>
-              <a:t>Title Text</a:t>
-            </a:r>
-          </a:p>
-        </p:txBody>
-      </p:sp>
-      <p:sp>
-        <p:nvSpPr>
-          <p:cNvPr id="30" name="Body Level One…"/>
-          <p:cNvSpPr txBox="1">
-            <a:spLocks noGrp="1"/>
-          </p:cNvSpPr>
-          <p:nvPr>
-            <p:ph type="body" sz="quarter" idx="1"/>
-          </p:nvPr>
-        </p:nvSpPr>
-        <p:spPr>
-          <a:xfrm>
-            <a:off x="3611564" y="13952537"/>
-            <a:ext cx="38862332" cy="7200902"/>
-          </a:xfrm>
-          <a:prstGeom prst="rect">
-            <a:avLst/>
-          </a:prstGeom>
-        </p:spPr>
-        <p:txBody>
-          <a:bodyPr anchor="b"/>
-          <a:lstStyle>
-            <a:lvl1pPr marL="0" indent="0">
-              <a:spcBef>
-                <a:spcPts val="400"/>
-              </a:spcBef>
-              <a:defRPr sz="2000"/>
-            </a:lvl1pPr>
-            <a:lvl2pPr marL="0" indent="0">
-              <a:spcBef>
-                <a:spcPts val="400"/>
-              </a:spcBef>
-              <a:buSzTx/>
-              <a:buNone/>
-              <a:defRPr sz="2000"/>
-            </a:lvl2pPr>
-            <a:lvl3pPr marL="0" indent="0">
-              <a:spcBef>
-                <a:spcPts val="400"/>
-              </a:spcBef>
-              <a:buSzTx/>
-              <a:buNone/>
-              <a:defRPr sz="2000"/>
-            </a:lvl3pPr>
-            <a:lvl4pPr marL="0" indent="0">
-              <a:spcBef>
-                <a:spcPts val="400"/>
-              </a:spcBef>
-              <a:buSzTx/>
-              <a:buNone/>
-              <a:defRPr sz="2000"/>
-            </a:lvl4pPr>
-            <a:lvl5pPr marL="0" indent="0">
-              <a:spcBef>
-                <a:spcPts val="400"/>
-              </a:spcBef>
-              <a:buSzTx/>
-              <a:buNone/>
-              <a:defRPr sz="2000"/>
-            </a:lvl5pPr>
-          </a:lstStyle>
-          <a:p>
-            <a:r>
-              <a:t>Body Level One</a:t>
-            </a:r>
-          </a:p>
-          <a:p>
-            <a:pPr lvl="1"/>
-            <a:r>
-              <a:t>Body Level Two</a:t>
-            </a:r>
-          </a:p>
-          <a:p>
-            <a:pPr lvl="2"/>
-            <a:r>
-              <a:t>Body Level Three</a:t>
-            </a:r>
-          </a:p>
-          <a:p>
-            <a:pPr lvl="3"/>
-            <a:r>
-              <a:t>Body Level Four</a:t>
-            </a:r>
-          </a:p>
-          <a:p>
-            <a:pPr lvl="4"/>
-            <a:r>
-              <a:t>Body Level Five</a:t>
-            </a:r>
-          </a:p>
-        </p:txBody>
-      </p:sp>
-      <p:sp>
-        <p:nvSpPr>
-          <p:cNvPr id="31" name="Slide Number"/>
-          <p:cNvSpPr txBox="1">
-            <a:spLocks noGrp="1"/>
-          </p:cNvSpPr>
-          <p:nvPr>
-            <p:ph type="sldNum" sz="quarter" idx="2"/>
-          </p:nvPr>
-        </p:nvSpPr>
-        <p:spPr>
-          <a:prstGeom prst="rect">
-            <a:avLst/>
-          </a:prstGeom>
-        </p:spPr>
-        <p:txBody>
-          <a:bodyPr/>
-          <a:lstStyle/>
-          <a:p>
-            <a:fld id="{86CB4B4D-7CA3-9044-876B-883B54F8677D}" type="slidenum">
-              <a:t>‹#›</a:t>
-            </a:fld>
-            <a:endParaRPr/>
-          </a:p>
-        </p:txBody>
-      </p:sp>
-    </p:spTree>
-  </p:cSld>
-  <p:clrMapOvr>
-    <a:masterClrMapping/>
-  </p:clrMapOvr>
-  <p:transition spd="med"/>
-</p:sldLayout>
-</file>
-
-<file path=ppt/slideLayouts/slideLayout4.xml><?xml version="1.0" encoding="utf-8"?>
-<p:sldLayout xmlns:a="http://schemas.openxmlformats.org/drawingml/2006/main" xmlns:r="http://schemas.openxmlformats.org/officeDocument/2006/relationships" xmlns:p="http://schemas.openxmlformats.org/presentationml/2006/main" type="tx">
-  <p:cSld name="Two Content">
-    <p:spTree>
-      <p:nvGrpSpPr>
-        <p:cNvPr id="1" name=""/>
-        <p:cNvGrpSpPr/>
-        <p:nvPr/>
-      </p:nvGrpSpPr>
-      <p:grpSpPr>
-        <a:xfrm>
-          <a:off x="0" y="0"/>
-          <a:ext cx="0" cy="0"/>
-          <a:chOff x="0" y="0"/>
-          <a:chExt cx="0" cy="0"/>
-        </a:xfrm>
-      </p:grpSpPr>
-      <p:sp>
-        <p:nvSpPr>
-          <p:cNvPr id="38" name="Title Text"/>
-          <p:cNvSpPr txBox="1">
-            <a:spLocks noGrp="1"/>
-          </p:cNvSpPr>
-          <p:nvPr>
-            <p:ph type="title"/>
-          </p:nvPr>
-        </p:nvSpPr>
-        <p:spPr>
-          <a:prstGeom prst="rect">
-            <a:avLst/>
-          </a:prstGeom>
-        </p:spPr>
-        <p:txBody>
-          <a:bodyPr/>
-          <a:lstStyle/>
-          <a:p>
-            <a:r>
-              <a:t>Title Text</a:t>
-            </a:r>
-          </a:p>
-        </p:txBody>
-      </p:sp>
-      <p:sp>
-        <p:nvSpPr>
-          <p:cNvPr id="39" name="Body Level One…"/>
-          <p:cNvSpPr txBox="1">
-            <a:spLocks noGrp="1"/>
-          </p:cNvSpPr>
-          <p:nvPr>
-            <p:ph type="body" sz="half" idx="1"/>
-          </p:nvPr>
-        </p:nvSpPr>
-        <p:spPr>
-          <a:xfrm>
-            <a:off x="2285338" y="7680325"/>
-            <a:ext cx="20495287" cy="21724938"/>
-          </a:xfrm>
-          <a:prstGeom prst="rect">
-            <a:avLst/>
-          </a:prstGeom>
-        </p:spPr>
-        <p:txBody>
-          <a:bodyPr/>
-          <a:lstStyle>
-            <a:lvl1pPr>
-              <a:spcBef>
-                <a:spcPts val="600"/>
-              </a:spcBef>
-              <a:defRPr sz="2800"/>
-            </a:lvl1pPr>
-            <a:lvl2pPr marL="1736725" indent="-1600200">
-              <a:spcBef>
-                <a:spcPts val="600"/>
-              </a:spcBef>
-              <a:buBlip>
-                <a:blip r:embed="rId2"/>
-              </a:buBlip>
-              <a:defRPr sz="2800"/>
-            </a:lvl2pPr>
-            <a:lvl3pPr marL="6309676" indent="-1920238">
-              <a:spcBef>
-                <a:spcPts val="600"/>
-              </a:spcBef>
-              <a:defRPr sz="2800"/>
-            </a:lvl3pPr>
-            <a:lvl4pPr marL="8712906" indent="-2131131">
-              <a:spcBef>
-                <a:spcPts val="600"/>
-              </a:spcBef>
-              <a:buBlip>
-                <a:blip r:embed="rId2"/>
-              </a:buBlip>
-              <a:defRPr sz="2800"/>
-            </a:lvl4pPr>
-            <a:lvl5pPr marL="10910006" indent="-2131131">
-              <a:spcBef>
-                <a:spcPts val="600"/>
-              </a:spcBef>
-              <a:buBlip>
-                <a:blip r:embed="rId2"/>
-              </a:buBlip>
-              <a:defRPr sz="2800"/>
-            </a:lvl5pPr>
-          </a:lstStyle>
-          <a:p>
-            <a:r>
-              <a:t>Body Level One</a:t>
-            </a:r>
-          </a:p>
-          <a:p>
-            <a:pPr lvl="1"/>
-            <a:r>
-              <a:t>Body Level Two</a:t>
-            </a:r>
-          </a:p>
-          <a:p>
-            <a:pPr lvl="2"/>
-            <a:r>
-              <a:t>Body Level Three</a:t>
-            </a:r>
-          </a:p>
-          <a:p>
-            <a:pPr lvl="3"/>
-            <a:r>
-              <a:t>Body Level Four</a:t>
-            </a:r>
-          </a:p>
-          <a:p>
-            <a:pPr lvl="4"/>
-            <a:r>
-              <a:t>Body Level Five</a:t>
-            </a:r>
-          </a:p>
-        </p:txBody>
-      </p:sp>
-      <p:sp>
-        <p:nvSpPr>
-          <p:cNvPr id="40" name="Slide Number"/>
-          <p:cNvSpPr txBox="1">
-            <a:spLocks noGrp="1"/>
-          </p:cNvSpPr>
-          <p:nvPr>
-            <p:ph type="sldNum" sz="quarter" idx="2"/>
-          </p:nvPr>
-        </p:nvSpPr>
-        <p:spPr>
-          <a:prstGeom prst="rect">
-            <a:avLst/>
-          </a:prstGeom>
-        </p:spPr>
-        <p:txBody>
-          <a:bodyPr/>
-          <a:lstStyle/>
-          <a:p>
-            <a:fld id="{86CB4B4D-7CA3-9044-876B-883B54F8677D}" type="slidenum">
-              <a:t>‹#›</a:t>
-            </a:fld>
-            <a:endParaRPr/>
-          </a:p>
-        </p:txBody>
-      </p:sp>
-    </p:spTree>
-  </p:cSld>
-  <p:clrMapOvr>
-    <a:masterClrMapping/>
-  </p:clrMapOvr>
-  <p:transition spd="med"/>
-</p:sldLayout>
-</file>
-
-<file path=ppt/slideLayouts/slideLayout5.xml><?xml version="1.0" encoding="utf-8"?>
-<p:sldLayout xmlns:a="http://schemas.openxmlformats.org/drawingml/2006/main" xmlns:r="http://schemas.openxmlformats.org/officeDocument/2006/relationships" xmlns:p="http://schemas.openxmlformats.org/presentationml/2006/main" type="tx">
-  <p:cSld name="Comparison">
-    <p:spTree>
-      <p:nvGrpSpPr>
-        <p:cNvPr id="1" name=""/>
-        <p:cNvGrpSpPr/>
-        <p:nvPr/>
-      </p:nvGrpSpPr>
-      <p:grpSpPr>
-        <a:xfrm>
-          <a:off x="0" y="0"/>
-          <a:ext cx="0" cy="0"/>
-          <a:chOff x="0" y="0"/>
-          <a:chExt cx="0" cy="0"/>
-        </a:xfrm>
-      </p:grpSpPr>
-      <p:sp>
-        <p:nvSpPr>
-          <p:cNvPr id="47" name="Title Text"/>
-          <p:cNvSpPr txBox="1">
-            <a:spLocks noGrp="1"/>
-          </p:cNvSpPr>
-          <p:nvPr>
-            <p:ph type="title"/>
-          </p:nvPr>
-        </p:nvSpPr>
-        <p:spPr>
-          <a:prstGeom prst="rect">
-            <a:avLst/>
-          </a:prstGeom>
-        </p:spPr>
-        <p:txBody>
-          <a:bodyPr/>
-          <a:lstStyle/>
-          <a:p>
-            <a:r>
-              <a:t>Title Text</a:t>
-            </a:r>
-          </a:p>
-        </p:txBody>
-      </p:sp>
-      <p:sp>
-        <p:nvSpPr>
-          <p:cNvPr id="48" name="Body Level One…"/>
-          <p:cNvSpPr txBox="1">
-            <a:spLocks noGrp="1"/>
-          </p:cNvSpPr>
-          <p:nvPr>
-            <p:ph type="body" sz="quarter" idx="1"/>
-          </p:nvPr>
-        </p:nvSpPr>
-        <p:spPr>
-          <a:xfrm>
-            <a:off x="2285338" y="7369178"/>
-            <a:ext cx="20200938" cy="3070227"/>
-          </a:xfrm>
-          <a:prstGeom prst="rect">
-            <a:avLst/>
-          </a:prstGeom>
-        </p:spPr>
-        <p:txBody>
-          <a:bodyPr anchor="b"/>
-          <a:lstStyle>
-            <a:lvl1pPr marL="0" indent="0">
-              <a:spcBef>
-                <a:spcPts val="500"/>
-              </a:spcBef>
-              <a:defRPr sz="2400"/>
-            </a:lvl1pPr>
-            <a:lvl2pPr marL="0" indent="0">
-              <a:spcBef>
-                <a:spcPts val="500"/>
-              </a:spcBef>
-              <a:buSzTx/>
-              <a:buNone/>
-              <a:defRPr sz="2400"/>
-            </a:lvl2pPr>
-            <a:lvl3pPr marL="0" indent="0">
-              <a:spcBef>
-                <a:spcPts val="500"/>
-              </a:spcBef>
-              <a:buSzTx/>
-              <a:buNone/>
-              <a:defRPr sz="2400"/>
-            </a:lvl3pPr>
-            <a:lvl4pPr marL="0" indent="0">
-              <a:spcBef>
-                <a:spcPts val="500"/>
-              </a:spcBef>
-              <a:buSzTx/>
-              <a:buNone/>
-              <a:defRPr sz="2400"/>
-            </a:lvl4pPr>
-            <a:lvl5pPr marL="0" indent="0">
-              <a:spcBef>
-                <a:spcPts val="500"/>
-              </a:spcBef>
-              <a:buSzTx/>
-              <a:buNone/>
-              <a:defRPr sz="2400"/>
-            </a:lvl5pPr>
-          </a:lstStyle>
-          <a:p>
-            <a:r>
-              <a:t>Body Level One</a:t>
-            </a:r>
-          </a:p>
-          <a:p>
-            <a:pPr lvl="1"/>
-            <a:r>
-              <a:t>Body Level Two</a:t>
-            </a:r>
-          </a:p>
-          <a:p>
-            <a:pPr lvl="2"/>
-            <a:r>
-              <a:t>Body Level Three</a:t>
-            </a:r>
-          </a:p>
-          <a:p>
-            <a:pPr lvl="3"/>
-            <a:r>
-              <a:t>Body Level Four</a:t>
-            </a:r>
-          </a:p>
-          <a:p>
-            <a:pPr lvl="4"/>
-            <a:r>
-              <a:t>Body Level Five</a:t>
-            </a:r>
-          </a:p>
-        </p:txBody>
-      </p:sp>
-      <p:sp>
-        <p:nvSpPr>
-          <p:cNvPr id="49" name="Text Placeholder 4"/>
-          <p:cNvSpPr>
-            <a:spLocks noGrp="1"/>
-          </p:cNvSpPr>
-          <p:nvPr>
-            <p:ph type="body" sz="quarter" idx="21"/>
-          </p:nvPr>
-        </p:nvSpPr>
-        <p:spPr>
-          <a:xfrm>
-            <a:off x="23225459" y="7369178"/>
-            <a:ext cx="20209205" cy="3070227"/>
-          </a:xfrm>
-          <a:prstGeom prst="rect">
-            <a:avLst/>
-          </a:prstGeom>
-        </p:spPr>
-        <p:txBody>
-          <a:bodyPr anchor="b"/>
-          <a:lstStyle/>
-          <a:p>
-            <a:endParaRPr/>
-          </a:p>
-        </p:txBody>
-      </p:sp>
-      <p:sp>
-        <p:nvSpPr>
-          <p:cNvPr id="50" name="Slide Number"/>
-          <p:cNvSpPr txBox="1">
-            <a:spLocks noGrp="1"/>
-          </p:cNvSpPr>
-          <p:nvPr>
-            <p:ph type="sldNum" sz="quarter" idx="2"/>
-          </p:nvPr>
-        </p:nvSpPr>
-        <p:spPr>
-          <a:prstGeom prst="rect">
-            <a:avLst/>
-          </a:prstGeom>
-        </p:spPr>
-        <p:txBody>
-          <a:bodyPr/>
-          <a:lstStyle/>
-          <a:p>
-            <a:fld id="{86CB4B4D-7CA3-9044-876B-883B54F8677D}" type="slidenum">
-              <a:t>‹#›</a:t>
-            </a:fld>
-            <a:endParaRPr/>
-          </a:p>
-        </p:txBody>
-      </p:sp>
-    </p:spTree>
-  </p:cSld>
-  <p:clrMapOvr>
-    <a:masterClrMapping/>
-  </p:clrMapOvr>
-  <p:transition spd="med"/>
-</p:sldLayout>
-</file>
-
-<file path=ppt/slideLayouts/slideLayout6.xml><?xml version="1.0" encoding="utf-8"?>
-<p:sldLayout xmlns:a="http://schemas.openxmlformats.org/drawingml/2006/main" xmlns:r="http://schemas.openxmlformats.org/officeDocument/2006/relationships" xmlns:p="http://schemas.openxmlformats.org/presentationml/2006/main" type="tx">
-  <p:cSld name="Title Only">
-    <p:spTree>
-      <p:nvGrpSpPr>
-        <p:cNvPr id="1" name=""/>
-        <p:cNvGrpSpPr/>
-        <p:nvPr/>
-      </p:nvGrpSpPr>
-      <p:grpSpPr>
-        <a:xfrm>
-          <a:off x="0" y="0"/>
-          <a:ext cx="0" cy="0"/>
-          <a:chOff x="0" y="0"/>
-          <a:chExt cx="0" cy="0"/>
-        </a:xfrm>
-      </p:grpSpPr>
-      <p:sp>
-        <p:nvSpPr>
-          <p:cNvPr id="57" name="Title Text"/>
-          <p:cNvSpPr txBox="1">
-            <a:spLocks noGrp="1"/>
-          </p:cNvSpPr>
-          <p:nvPr>
-            <p:ph type="title"/>
-          </p:nvPr>
-        </p:nvSpPr>
-        <p:spPr>
-          <a:prstGeom prst="rect">
-            <a:avLst/>
-          </a:prstGeom>
-        </p:spPr>
-        <p:txBody>
-          <a:bodyPr/>
-          <a:lstStyle/>
-          <a:p>
-            <a:r>
-              <a:t>Title Text</a:t>
-            </a:r>
-          </a:p>
-        </p:txBody>
-      </p:sp>
-      <p:sp>
-        <p:nvSpPr>
-          <p:cNvPr id="58" name="Slide Number"/>
-          <p:cNvSpPr txBox="1">
-            <a:spLocks noGrp="1"/>
-          </p:cNvSpPr>
-          <p:nvPr>
-            <p:ph type="sldNum" sz="quarter" idx="2"/>
-          </p:nvPr>
-        </p:nvSpPr>
-        <p:spPr>
-          <a:prstGeom prst="rect">
-            <a:avLst/>
-          </a:prstGeom>
-        </p:spPr>
-        <p:txBody>
-          <a:bodyPr/>
-          <a:lstStyle/>
-          <a:p>
-            <a:fld id="{86CB4B4D-7CA3-9044-876B-883B54F8677D}" type="slidenum">
-              <a:t>‹#›</a:t>
-            </a:fld>
-            <a:endParaRPr/>
-          </a:p>
-        </p:txBody>
-      </p:sp>
-    </p:spTree>
-  </p:cSld>
-  <p:clrMapOvr>
-    <a:masterClrMapping/>
-  </p:clrMapOvr>
-  <p:transition spd="med"/>
-</p:sldLayout>
-</file>
-
-<file path=ppt/slideLayouts/slideLayout7.xml><?xml version="1.0" encoding="utf-8"?>
-<p:sldLayout xmlns:a="http://schemas.openxmlformats.org/drawingml/2006/main" xmlns:r="http://schemas.openxmlformats.org/officeDocument/2006/relationships" xmlns:p="http://schemas.openxmlformats.org/presentationml/2006/main" type="tx">
-  <p:cSld name="Blank">
-    <p:spTree>
-      <p:nvGrpSpPr>
-        <p:cNvPr id="1" name=""/>
-        <p:cNvGrpSpPr/>
-        <p:nvPr/>
-      </p:nvGrpSpPr>
-      <p:grpSpPr>
-        <a:xfrm>
-          <a:off x="0" y="0"/>
-          <a:ext cx="0" cy="0"/>
-          <a:chOff x="0" y="0"/>
-          <a:chExt cx="0" cy="0"/>
-        </a:xfrm>
-      </p:grpSpPr>
-      <p:sp>
-        <p:nvSpPr>
-          <p:cNvPr id="65" name="Slide Number"/>
-          <p:cNvSpPr txBox="1">
-            <a:spLocks noGrp="1"/>
-          </p:cNvSpPr>
-          <p:nvPr>
-            <p:ph type="sldNum" sz="quarter" idx="2"/>
-          </p:nvPr>
-        </p:nvSpPr>
-        <p:spPr>
-          <a:prstGeom prst="rect">
-            <a:avLst/>
-          </a:prstGeom>
-        </p:spPr>
-        <p:txBody>
-          <a:bodyPr/>
-          <a:lstStyle/>
-          <a:p>
-            <a:fld id="{86CB4B4D-7CA3-9044-876B-883B54F8677D}" type="slidenum">
-              <a:t>‹#›</a:t>
-            </a:fld>
-            <a:endParaRPr/>
-          </a:p>
-        </p:txBody>
-      </p:sp>
-    </p:spTree>
-  </p:cSld>
-  <p:clrMapOvr>
-    <a:masterClrMapping/>
-  </p:clrMapOvr>
-  <p:transition spd="med"/>
-</p:sldLayout>
-</file>
-
-<file path=ppt/slideLayouts/slideLayout8.xml><?xml version="1.0" encoding="utf-8"?>
-<p:sldLayout xmlns:a="http://schemas.openxmlformats.org/drawingml/2006/main" xmlns:r="http://schemas.openxmlformats.org/officeDocument/2006/relationships" xmlns:p="http://schemas.openxmlformats.org/presentationml/2006/main" type="tx">
-  <p:cSld name="Content with Caption">
-    <p:spTree>
-      <p:nvGrpSpPr>
-        <p:cNvPr id="1" name=""/>
-        <p:cNvGrpSpPr/>
-        <p:nvPr/>
-      </p:nvGrpSpPr>
-      <p:grpSpPr>
-        <a:xfrm>
-          <a:off x="0" y="0"/>
-          <a:ext cx="0" cy="0"/>
-          <a:chOff x="0" y="0"/>
-          <a:chExt cx="0" cy="0"/>
-        </a:xfrm>
-      </p:grpSpPr>
-      <p:sp>
-        <p:nvSpPr>
-          <p:cNvPr id="72" name="Title Text"/>
-          <p:cNvSpPr txBox="1">
-            <a:spLocks noGrp="1"/>
-          </p:cNvSpPr>
-          <p:nvPr>
-            <p:ph type="title"/>
-          </p:nvPr>
-        </p:nvSpPr>
-        <p:spPr>
-          <a:xfrm>
-            <a:off x="2285338" y="1311275"/>
-            <a:ext cx="15041563" cy="5576888"/>
-          </a:xfrm>
-          <a:prstGeom prst="rect">
-            <a:avLst/>
-          </a:prstGeom>
-        </p:spPr>
-        <p:txBody>
-          <a:bodyPr anchor="b"/>
-          <a:lstStyle>
-            <a:lvl1pPr>
-              <a:defRPr sz="2000"/>
-            </a:lvl1pPr>
-          </a:lstStyle>
-          <a:p>
-            <a:r>
-              <a:t>Title Text</a:t>
-            </a:r>
-          </a:p>
-        </p:txBody>
-      </p:sp>
-      <p:sp>
-        <p:nvSpPr>
-          <p:cNvPr id="73" name="Body Level One…"/>
-          <p:cNvSpPr txBox="1">
-            <a:spLocks noGrp="1"/>
-          </p:cNvSpPr>
-          <p:nvPr>
-            <p:ph type="body" idx="1"/>
-          </p:nvPr>
-        </p:nvSpPr>
-        <p:spPr>
-          <a:xfrm>
-            <a:off x="17875910" y="1311275"/>
-            <a:ext cx="25558752" cy="28093988"/>
-          </a:xfrm>
-          <a:prstGeom prst="rect">
-            <a:avLst/>
-          </a:prstGeom>
-        </p:spPr>
-        <p:txBody>
-          <a:bodyPr/>
-          <a:lstStyle>
-            <a:lvl1pPr>
-              <a:spcBef>
-                <a:spcPts val="700"/>
-              </a:spcBef>
-              <a:defRPr sz="3200"/>
-            </a:lvl1pPr>
-            <a:lvl2pPr marL="1704066" indent="-1567542">
-              <a:spcBef>
-                <a:spcPts val="700"/>
-              </a:spcBef>
-              <a:buBlip>
-                <a:blip r:embed="rId2"/>
-              </a:buBlip>
-              <a:defRPr sz="3200"/>
-            </a:lvl2pPr>
-            <a:lvl3pPr marL="6218237" indent="-1828800">
-              <a:spcBef>
-                <a:spcPts val="700"/>
-              </a:spcBef>
-              <a:defRPr sz="3200"/>
-            </a:lvl3pPr>
-            <a:lvl4pPr marL="8773796" indent="-2192021">
-              <a:spcBef>
-                <a:spcPts val="700"/>
-              </a:spcBef>
-              <a:buBlip>
-                <a:blip r:embed="rId2"/>
-              </a:buBlip>
-              <a:defRPr sz="3200"/>
-            </a:lvl4pPr>
-            <a:lvl5pPr marL="10970896" indent="-2192021">
-              <a:spcBef>
-                <a:spcPts val="700"/>
-              </a:spcBef>
-              <a:buBlip>
-                <a:blip r:embed="rId2"/>
-              </a:buBlip>
-              <a:defRPr sz="3200"/>
-            </a:lvl5pPr>
-          </a:lstStyle>
-          <a:p>
-            <a:r>
-              <a:t>Body Level One</a:t>
-            </a:r>
-          </a:p>
-          <a:p>
-            <a:pPr lvl="1"/>
-            <a:r>
-              <a:t>Body Level Two</a:t>
-            </a:r>
-          </a:p>
-          <a:p>
-            <a:pPr lvl="2"/>
-            <a:r>
-              <a:t>Body Level Three</a:t>
-            </a:r>
-          </a:p>
-          <a:p>
-            <a:pPr lvl="3"/>
-            <a:r>
-              <a:t>Body Level Four</a:t>
-            </a:r>
-          </a:p>
-          <a:p>
-            <a:pPr lvl="4"/>
-            <a:r>
-              <a:t>Body Level Five</a:t>
-            </a:r>
-          </a:p>
-        </p:txBody>
-      </p:sp>
-      <p:sp>
-        <p:nvSpPr>
-          <p:cNvPr id="74" name="Text Placeholder 3"/>
-          <p:cNvSpPr>
-            <a:spLocks noGrp="1"/>
-          </p:cNvSpPr>
-          <p:nvPr>
-            <p:ph type="body" sz="half" idx="21"/>
-          </p:nvPr>
-        </p:nvSpPr>
-        <p:spPr>
-          <a:xfrm>
-            <a:off x="2285337" y="6888162"/>
-            <a:ext cx="15041565" cy="22517104"/>
-          </a:xfrm>
-          <a:prstGeom prst="rect">
-            <a:avLst/>
-          </a:prstGeom>
-        </p:spPr>
-        <p:txBody>
-          <a:bodyPr/>
-          <a:lstStyle/>
-          <a:p>
-            <a:endParaRPr/>
-          </a:p>
-        </p:txBody>
-      </p:sp>
-      <p:sp>
-        <p:nvSpPr>
-          <p:cNvPr id="75" name="Slide Number"/>
-          <p:cNvSpPr txBox="1">
-            <a:spLocks noGrp="1"/>
-          </p:cNvSpPr>
-          <p:nvPr>
-            <p:ph type="sldNum" sz="quarter" idx="2"/>
-          </p:nvPr>
-        </p:nvSpPr>
-        <p:spPr>
-          <a:prstGeom prst="rect">
-            <a:avLst/>
-          </a:prstGeom>
-        </p:spPr>
-        <p:txBody>
-          <a:bodyPr/>
-          <a:lstStyle/>
-          <a:p>
-            <a:fld id="{86CB4B4D-7CA3-9044-876B-883B54F8677D}" type="slidenum">
-              <a:t>‹#›</a:t>
-            </a:fld>
-            <a:endParaRPr/>
-          </a:p>
-        </p:txBody>
-      </p:sp>
-    </p:spTree>
-  </p:cSld>
-  <p:clrMapOvr>
-    <a:masterClrMapping/>
-  </p:clrMapOvr>
-  <p:transition spd="med"/>
-</p:sldLayout>
-</file>
-
-<file path=ppt/slideLayouts/slideLayout9.xml><?xml version="1.0" encoding="utf-8"?>
-<p:sldLayout xmlns:a="http://schemas.openxmlformats.org/drawingml/2006/main" xmlns:r="http://schemas.openxmlformats.org/officeDocument/2006/relationships" xmlns:p="http://schemas.openxmlformats.org/presentationml/2006/main" type="tx">
-  <p:cSld name="Picture with Caption">
-    <p:spTree>
-      <p:nvGrpSpPr>
-        <p:cNvPr id="1" name=""/>
-        <p:cNvGrpSpPr/>
-        <p:nvPr/>
-      </p:nvGrpSpPr>
-      <p:grpSpPr>
-        <a:xfrm>
-          <a:off x="0" y="0"/>
-          <a:ext cx="0" cy="0"/>
-          <a:chOff x="0" y="0"/>
-          <a:chExt cx="0" cy="0"/>
-        </a:xfrm>
-      </p:grpSpPr>
-      <p:sp>
-        <p:nvSpPr>
-          <p:cNvPr id="82" name="Title Text"/>
-          <p:cNvSpPr txBox="1">
-            <a:spLocks noGrp="1"/>
-          </p:cNvSpPr>
-          <p:nvPr>
-            <p:ph type="title"/>
-          </p:nvPr>
-        </p:nvSpPr>
-        <p:spPr>
-          <a:xfrm>
-            <a:off x="8961108" y="23042568"/>
-            <a:ext cx="27432330" cy="2720977"/>
-          </a:xfrm>
-          <a:prstGeom prst="rect">
-            <a:avLst/>
-          </a:prstGeom>
-        </p:spPr>
-        <p:txBody>
-          <a:bodyPr anchor="b"/>
-          <a:lstStyle>
-            <a:lvl1pPr>
-              <a:defRPr sz="2000"/>
-            </a:lvl1pPr>
-          </a:lstStyle>
-          <a:p>
-            <a:r>
-              <a:t>Title Text</a:t>
-            </a:r>
-          </a:p>
-        </p:txBody>
-      </p:sp>
-      <p:sp>
-        <p:nvSpPr>
-          <p:cNvPr id="83" name="Picture Placeholder 2"/>
-          <p:cNvSpPr>
-            <a:spLocks noGrp="1"/>
-          </p:cNvSpPr>
-          <p:nvPr>
-            <p:ph type="pic" sz="half" idx="21"/>
-          </p:nvPr>
-        </p:nvSpPr>
-        <p:spPr>
-          <a:xfrm>
-            <a:off x="8961108" y="2941641"/>
-            <a:ext cx="27432330" cy="19750091"/>
-          </a:xfrm>
-          <a:prstGeom prst="rect">
-            <a:avLst/>
-          </a:prstGeom>
-        </p:spPr>
-        <p:txBody>
-          <a:bodyPr lIns="91439" tIns="45719" rIns="91439" bIns="45719">
-            <a:noAutofit/>
-          </a:bodyPr>
-          <a:lstStyle/>
-          <a:p>
-            <a:endParaRPr/>
-          </a:p>
-        </p:txBody>
-      </p:sp>
-      <p:sp>
-        <p:nvSpPr>
-          <p:cNvPr id="84" name="Body Level One…"/>
-          <p:cNvSpPr txBox="1">
-            <a:spLocks noGrp="1"/>
-          </p:cNvSpPr>
-          <p:nvPr>
-            <p:ph type="body" sz="quarter" idx="1"/>
-          </p:nvPr>
-        </p:nvSpPr>
-        <p:spPr>
-          <a:xfrm>
-            <a:off x="8961108" y="25763543"/>
-            <a:ext cx="27432330" cy="3862389"/>
-          </a:xfrm>
-          <a:prstGeom prst="rect">
-            <a:avLst/>
-          </a:prstGeom>
-        </p:spPr>
-        <p:txBody>
-          <a:bodyPr/>
-          <a:lstStyle>
-            <a:lvl1pPr marL="0" indent="0">
-              <a:spcBef>
-                <a:spcPts val="300"/>
-              </a:spcBef>
-              <a:defRPr sz="1400"/>
-            </a:lvl1pPr>
-            <a:lvl2pPr marL="0" indent="0">
-              <a:spcBef>
-                <a:spcPts val="300"/>
-              </a:spcBef>
-              <a:buSzTx/>
-              <a:buNone/>
-              <a:defRPr sz="1400"/>
-            </a:lvl2pPr>
-            <a:lvl3pPr marL="0" indent="0">
-              <a:spcBef>
-                <a:spcPts val="300"/>
-              </a:spcBef>
-              <a:buSzTx/>
-              <a:buNone/>
-              <a:defRPr sz="1400"/>
-            </a:lvl3pPr>
-            <a:lvl4pPr marL="0" indent="0">
-              <a:spcBef>
-                <a:spcPts val="300"/>
-              </a:spcBef>
-              <a:buSzTx/>
-              <a:buNone/>
-              <a:defRPr sz="1400"/>
-            </a:lvl4pPr>
-            <a:lvl5pPr marL="0" indent="0">
-              <a:spcBef>
-                <a:spcPts val="300"/>
-              </a:spcBef>
-              <a:buSzTx/>
-              <a:buNone/>
-              <a:defRPr sz="1400"/>
-            </a:lvl5pPr>
-          </a:lstStyle>
-          <a:p>
-            <a:r>
-              <a:t>Body Level One</a:t>
-            </a:r>
-          </a:p>
-          <a:p>
-            <a:pPr lvl="1"/>
-            <a:r>
-              <a:t>Body Level Two</a:t>
-            </a:r>
-          </a:p>
-          <a:p>
-            <a:pPr lvl="2"/>
-            <a:r>
-              <a:t>Body Level Three</a:t>
-            </a:r>
-          </a:p>
-          <a:p>
-            <a:pPr lvl="3"/>
-            <a:r>
-              <a:t>Body Level Four</a:t>
-            </a:r>
-          </a:p>
-          <a:p>
-            <a:pPr lvl="4"/>
-            <a:r>
-              <a:t>Body Level Five</a:t>
-            </a:r>
-          </a:p>
-        </p:txBody>
-      </p:sp>
-      <p:sp>
-        <p:nvSpPr>
-          <p:cNvPr id="85" name="Slide Number"/>
-          <p:cNvSpPr txBox="1">
-            <a:spLocks noGrp="1"/>
-          </p:cNvSpPr>
-          <p:nvPr>
-            <p:ph type="sldNum" sz="quarter" idx="2"/>
-          </p:nvPr>
-        </p:nvSpPr>
-        <p:spPr>
-          <a:prstGeom prst="rect">
-            <a:avLst/>
-          </a:prstGeom>
-        </p:spPr>
-        <p:txBody>
-          <a:bodyPr/>
-          <a:lstStyle/>
-          <a:p>
-            <a:fld id="{86CB4B4D-7CA3-9044-876B-883B54F8677D}" type="slidenum">
-              <a:t>‹#›</a:t>
-            </a:fld>
-            <a:endParaRPr/>
-          </a:p>
-        </p:txBody>
-      </p:sp>
-    </p:spTree>
-  </p:cSld>
-  <p:clrMapOvr>
-    <a:masterClrMapping/>
-  </p:clrMapOvr>
-  <p:transition spd="med"/>
-</p:sldLayout>
-</file>
-
 <file path=ppt/slideMasters/slideMaster1.xml><?xml version="1.0" encoding="utf-8"?>
 <p:sldMaster xmlns:a="http://schemas.openxmlformats.org/drawingml/2006/main" xmlns:r="http://schemas.openxmlformats.org/officeDocument/2006/relationships" xmlns:p="http://schemas.openxmlformats.org/presentationml/2006/main">
   <p:cSld>
     <p:bg>
-      <p:bgPr>
-        <a:solidFill>
-          <a:srgbClr val="FFFFFF"/>
-        </a:solidFill>
-        <a:effectLst/>
-      </p:bgPr>
+      <p:bgRef idx="1001">
+        <a:schemeClr val="bg2"/>
+      </p:bgRef>
     </p:bg>
     <p:spTree>
       <p:nvGrpSpPr>
@@ -2218,8 +2295,8 @@
         </p:nvSpPr>
         <p:spPr>
           <a:xfrm>
-            <a:off x="2285339" y="1317625"/>
-            <a:ext cx="41149325" cy="5486400"/>
+            <a:off x="1371205" y="1464028"/>
+            <a:ext cx="24689595" cy="6096000"/>
           </a:xfrm>
           <a:prstGeom prst="rect">
             <a:avLst/>
@@ -2229,7 +2306,7 @@
           </a:ln>
           <a:extLst>
             <a:ext uri="{C572A759-6A51-4108-AA02-DFA0A04FC94B}">
-              <ma14:wrappingTextBoxFlag xmlns:ma14="http://schemas.microsoft.com/office/mac/drawingml/2011/main" xmlns:a14="http://schemas.microsoft.com/office/drawing/2010/main" xmlns:m="http://schemas.openxmlformats.org/officeDocument/2006/math" xmlns="" val="1"/>
+              <ma14:wrappingTextBoxFlag xmlns="" xmlns:m="http://schemas.openxmlformats.org/officeDocument/2006/math" xmlns:a14="http://schemas.microsoft.com/office/drawing/2010/main" xmlns:ma14="http://schemas.microsoft.com/office/mac/drawingml/2011/main" val="1"/>
             </a:ext>
           </a:extLst>
         </p:spPr>
@@ -2257,8 +2334,8 @@
         </p:nvSpPr>
         <p:spPr>
           <a:xfrm>
-            <a:off x="2285339" y="7680325"/>
-            <a:ext cx="41149325" cy="21724938"/>
+            <a:off x="1371205" y="8533695"/>
+            <a:ext cx="24689595" cy="24138820"/>
           </a:xfrm>
           <a:prstGeom prst="rect">
             <a:avLst/>
@@ -2268,7 +2345,7 @@
           </a:ln>
           <a:extLst>
             <a:ext uri="{C572A759-6A51-4108-AA02-DFA0A04FC94B}">
-              <ma14:wrappingTextBoxFlag xmlns:ma14="http://schemas.microsoft.com/office/mac/drawingml/2011/main" xmlns:a14="http://schemas.microsoft.com/office/drawing/2010/main" xmlns:m="http://schemas.openxmlformats.org/officeDocument/2006/math" xmlns="" val="1"/>
+              <ma14:wrappingTextBoxFlag xmlns="" xmlns:m="http://schemas.openxmlformats.org/officeDocument/2006/math" xmlns:a14="http://schemas.microsoft.com/office/drawing/2010/main" xmlns:ma14="http://schemas.microsoft.com/office/mac/drawingml/2011/main" val="1"/>
             </a:ext>
           </a:extLst>
         </p:spPr>
@@ -2279,17 +2356,17 @@
           <a:lstStyle>
             <a:lvl2pPr>
               <a:buBlip>
-                <a:blip r:embed="rId13"/>
+                <a:blip r:embed="rId12"/>
               </a:buBlip>
             </a:lvl2pPr>
             <a:lvl4pPr>
               <a:buBlip>
-                <a:blip r:embed="rId13"/>
+                <a:blip r:embed="rId12"/>
               </a:buBlip>
             </a:lvl4pPr>
             <a:lvl5pPr>
               <a:buBlip>
-                <a:blip r:embed="rId13"/>
+                <a:blip r:embed="rId12"/>
               </a:buBlip>
             </a:lvl5pPr>
           </a:lstStyle>
@@ -2336,8 +2413,8 @@
         </p:nvSpPr>
         <p:spPr>
           <a:xfrm>
-            <a:off x="32492346" y="30375859"/>
-            <a:ext cx="273654" cy="269239"/>
+            <a:off x="19357278" y="33751808"/>
+            <a:ext cx="302323" cy="297450"/>
           </a:xfrm>
           <a:prstGeom prst="rect">
             <a:avLst/>
@@ -2352,7 +2429,7 @@
           </a:bodyPr>
           <a:lstStyle>
             <a:lvl1pPr algn="r">
-              <a:defRPr sz="1200">
+              <a:defRPr sz="1333">
                 <a:solidFill>
                   <a:srgbClr val="0000FF"/>
                 </a:solidFill>
@@ -2369,24 +2446,23 @@
       </p:sp>
     </p:spTree>
   </p:cSld>
-  <p:clrMap bg1="dk1" tx1="lt1" bg2="dk2" tx2="lt2" accent1="accent1" accent2="accent2" accent3="accent3" accent4="accent4" accent5="accent5" accent6="accent6" hlink="hlink" folHlink="folHlink"/>
+  <p:clrMap bg1="lt1" tx1="dk1" bg2="lt2" tx2="dk2" accent1="accent1" accent2="accent2" accent3="accent3" accent4="accent4" accent5="accent5" accent6="accent6" hlink="hlink" folHlink="folHlink"/>
   <p:sldLayoutIdLst>
     <p:sldLayoutId id="2147483649" r:id="rId1"/>
-    <p:sldLayoutId id="2147483650" r:id="rId2"/>
-    <p:sldLayoutId id="2147483651" r:id="rId3"/>
-    <p:sldLayoutId id="2147483652" r:id="rId4"/>
-    <p:sldLayoutId id="2147483653" r:id="rId5"/>
-    <p:sldLayoutId id="2147483654" r:id="rId6"/>
-    <p:sldLayoutId id="2147483655" r:id="rId7"/>
-    <p:sldLayoutId id="2147483656" r:id="rId8"/>
-    <p:sldLayoutId id="2147483657" r:id="rId9"/>
-    <p:sldLayoutId id="2147483658" r:id="rId10"/>
-    <p:sldLayoutId id="2147483659" r:id="rId11"/>
+    <p:sldLayoutId id="2147483651" r:id="rId2"/>
+    <p:sldLayoutId id="2147483652" r:id="rId3"/>
+    <p:sldLayoutId id="2147483653" r:id="rId4"/>
+    <p:sldLayoutId id="2147483654" r:id="rId5"/>
+    <p:sldLayoutId id="2147483655" r:id="rId6"/>
+    <p:sldLayoutId id="2147483656" r:id="rId7"/>
+    <p:sldLayoutId id="2147483657" r:id="rId8"/>
+    <p:sldLayoutId id="2147483658" r:id="rId9"/>
+    <p:sldLayoutId id="2147483659" r:id="rId10"/>
   </p:sldLayoutIdLst>
   <p:transition spd="med"/>
   <p:txStyles>
     <p:titleStyle>
-      <a:lvl1pPr marL="0" marR="0" indent="0" algn="l" defTabSz="4389437" rtl="0" latinLnBrk="0">
+      <a:lvl1pPr marL="0" marR="0" indent="0" algn="l" defTabSz="4877060" rtl="0" latinLnBrk="0">
         <a:lnSpc>
           <a:spcPct val="100000"/>
         </a:lnSpc>
@@ -2401,7 +2477,7 @@
         <a:buFontTx/>
         <a:buNone/>
         <a:tabLst/>
-        <a:defRPr sz="10100" b="1" i="0" u="none" strike="noStrike" cap="none" spc="0" baseline="0">
+        <a:defRPr sz="11222" b="1" i="0" u="none" strike="noStrike" cap="none" spc="0" baseline="0">
           <a:solidFill>
             <a:schemeClr val="accent1"/>
           </a:solidFill>
@@ -2412,7 +2488,7 @@
           <a:sym typeface="Helvetica"/>
         </a:defRPr>
       </a:lvl1pPr>
-      <a:lvl2pPr marL="0" marR="0" indent="0" algn="l" defTabSz="4389437" rtl="0" latinLnBrk="0">
+      <a:lvl2pPr marL="0" marR="0" indent="0" algn="l" defTabSz="4877060" rtl="0" latinLnBrk="0">
         <a:lnSpc>
           <a:spcPct val="100000"/>
         </a:lnSpc>
@@ -2427,7 +2503,7 @@
         <a:buFontTx/>
         <a:buNone/>
         <a:tabLst/>
-        <a:defRPr sz="10100" b="1" i="0" u="none" strike="noStrike" cap="none" spc="0" baseline="0">
+        <a:defRPr sz="11222" b="1" i="0" u="none" strike="noStrike" cap="none" spc="0" baseline="0">
           <a:solidFill>
             <a:schemeClr val="accent1"/>
           </a:solidFill>
@@ -2438,7 +2514,7 @@
           <a:sym typeface="Helvetica"/>
         </a:defRPr>
       </a:lvl2pPr>
-      <a:lvl3pPr marL="0" marR="0" indent="0" algn="l" defTabSz="4389437" rtl="0" latinLnBrk="0">
+      <a:lvl3pPr marL="0" marR="0" indent="0" algn="l" defTabSz="4877060" rtl="0" latinLnBrk="0">
         <a:lnSpc>
           <a:spcPct val="100000"/>
         </a:lnSpc>
@@ -2453,7 +2529,7 @@
         <a:buFontTx/>
         <a:buNone/>
         <a:tabLst/>
-        <a:defRPr sz="10100" b="1" i="0" u="none" strike="noStrike" cap="none" spc="0" baseline="0">
+        <a:defRPr sz="11222" b="1" i="0" u="none" strike="noStrike" cap="none" spc="0" baseline="0">
           <a:solidFill>
             <a:schemeClr val="accent1"/>
           </a:solidFill>
@@ -2464,7 +2540,7 @@
           <a:sym typeface="Helvetica"/>
         </a:defRPr>
       </a:lvl3pPr>
-      <a:lvl4pPr marL="0" marR="0" indent="0" algn="l" defTabSz="4389437" rtl="0" latinLnBrk="0">
+      <a:lvl4pPr marL="0" marR="0" indent="0" algn="l" defTabSz="4877060" rtl="0" latinLnBrk="0">
         <a:lnSpc>
           <a:spcPct val="100000"/>
         </a:lnSpc>
@@ -2479,7 +2555,7 @@
         <a:buFontTx/>
         <a:buNone/>
         <a:tabLst/>
-        <a:defRPr sz="10100" b="1" i="0" u="none" strike="noStrike" cap="none" spc="0" baseline="0">
+        <a:defRPr sz="11222" b="1" i="0" u="none" strike="noStrike" cap="none" spc="0" baseline="0">
           <a:solidFill>
             <a:schemeClr val="accent1"/>
           </a:solidFill>
@@ -2490,7 +2566,7 @@
           <a:sym typeface="Helvetica"/>
         </a:defRPr>
       </a:lvl4pPr>
-      <a:lvl5pPr marL="0" marR="0" indent="0" algn="l" defTabSz="4389437" rtl="0" latinLnBrk="0">
+      <a:lvl5pPr marL="0" marR="0" indent="0" algn="l" defTabSz="4877060" rtl="0" latinLnBrk="0">
         <a:lnSpc>
           <a:spcPct val="100000"/>
         </a:lnSpc>
@@ -2505,7 +2581,7 @@
         <a:buFontTx/>
         <a:buNone/>
         <a:tabLst/>
-        <a:defRPr sz="10100" b="1" i="0" u="none" strike="noStrike" cap="none" spc="0" baseline="0">
+        <a:defRPr sz="11222" b="1" i="0" u="none" strike="noStrike" cap="none" spc="0" baseline="0">
           <a:solidFill>
             <a:schemeClr val="accent1"/>
           </a:solidFill>
@@ -2516,7 +2592,7 @@
           <a:sym typeface="Helvetica"/>
         </a:defRPr>
       </a:lvl5pPr>
-      <a:lvl6pPr marL="0" marR="0" indent="0" algn="l" defTabSz="4389437" rtl="0" latinLnBrk="0">
+      <a:lvl6pPr marL="0" marR="0" indent="0" algn="l" defTabSz="4877060" rtl="0" latinLnBrk="0">
         <a:lnSpc>
           <a:spcPct val="100000"/>
         </a:lnSpc>
@@ -2531,7 +2607,7 @@
         <a:buFontTx/>
         <a:buNone/>
         <a:tabLst/>
-        <a:defRPr sz="10100" b="1" i="0" u="none" strike="noStrike" cap="none" spc="0" baseline="0">
+        <a:defRPr sz="11222" b="1" i="0" u="none" strike="noStrike" cap="none" spc="0" baseline="0">
           <a:solidFill>
             <a:schemeClr val="accent1"/>
           </a:solidFill>
@@ -2542,7 +2618,7 @@
           <a:sym typeface="Helvetica"/>
         </a:defRPr>
       </a:lvl6pPr>
-      <a:lvl7pPr marL="0" marR="0" indent="0" algn="l" defTabSz="4389437" rtl="0" latinLnBrk="0">
+      <a:lvl7pPr marL="0" marR="0" indent="0" algn="l" defTabSz="4877060" rtl="0" latinLnBrk="0">
         <a:lnSpc>
           <a:spcPct val="100000"/>
         </a:lnSpc>
@@ -2557,7 +2633,7 @@
         <a:buFontTx/>
         <a:buNone/>
         <a:tabLst/>
-        <a:defRPr sz="10100" b="1" i="0" u="none" strike="noStrike" cap="none" spc="0" baseline="0">
+        <a:defRPr sz="11222" b="1" i="0" u="none" strike="noStrike" cap="none" spc="0" baseline="0">
           <a:solidFill>
             <a:schemeClr val="accent1"/>
           </a:solidFill>
@@ -2568,7 +2644,7 @@
           <a:sym typeface="Helvetica"/>
         </a:defRPr>
       </a:lvl7pPr>
-      <a:lvl8pPr marL="0" marR="0" indent="0" algn="l" defTabSz="4389437" rtl="0" latinLnBrk="0">
+      <a:lvl8pPr marL="0" marR="0" indent="0" algn="l" defTabSz="4877060" rtl="0" latinLnBrk="0">
         <a:lnSpc>
           <a:spcPct val="100000"/>
         </a:lnSpc>
@@ -2583,7 +2659,7 @@
         <a:buFontTx/>
         <a:buNone/>
         <a:tabLst/>
-        <a:defRPr sz="10100" b="1" i="0" u="none" strike="noStrike" cap="none" spc="0" baseline="0">
+        <a:defRPr sz="11222" b="1" i="0" u="none" strike="noStrike" cap="none" spc="0" baseline="0">
           <a:solidFill>
             <a:schemeClr val="accent1"/>
           </a:solidFill>
@@ -2594,7 +2670,7 @@
           <a:sym typeface="Helvetica"/>
         </a:defRPr>
       </a:lvl8pPr>
-      <a:lvl9pPr marL="0" marR="0" indent="0" algn="l" defTabSz="4389437" rtl="0" latinLnBrk="0">
+      <a:lvl9pPr marL="0" marR="0" indent="0" algn="l" defTabSz="4877060" rtl="0" latinLnBrk="0">
         <a:lnSpc>
           <a:spcPct val="100000"/>
         </a:lnSpc>
@@ -2609,7 +2685,7 @@
         <a:buFontTx/>
         <a:buNone/>
         <a:tabLst/>
-        <a:defRPr sz="10100" b="1" i="0" u="none" strike="noStrike" cap="none" spc="0" baseline="0">
+        <a:defRPr sz="11222" b="1" i="0" u="none" strike="noStrike" cap="none" spc="0" baseline="0">
           <a:solidFill>
             <a:schemeClr val="accent1"/>
           </a:solidFill>
@@ -2622,12 +2698,12 @@
       </a:lvl9pPr>
     </p:titleStyle>
     <p:bodyStyle>
-      <a:lvl1pPr marL="1371600" marR="0" indent="-1371600" algn="l" defTabSz="4389437" rtl="0" latinLnBrk="0">
+      <a:lvl1pPr marL="1523972" marR="0" indent="-1523972" algn="l" defTabSz="4877060" rtl="0" latinLnBrk="0">
         <a:lnSpc>
           <a:spcPct val="100000"/>
         </a:lnSpc>
         <a:spcBef>
-          <a:spcPts val="1700"/>
+          <a:spcPts val="1889"/>
         </a:spcBef>
         <a:spcAft>
           <a:spcPts val="0"/>
@@ -2637,7 +2713,7 @@
         <a:buFontTx/>
         <a:buNone/>
         <a:tabLst/>
-        <a:defRPr sz="7200" b="1" i="0" u="none" strike="noStrike" cap="none" spc="0" baseline="0">
+        <a:defRPr sz="8000" b="1" i="0" u="none" strike="noStrike" cap="none" spc="0" baseline="0">
           <a:solidFill>
             <a:srgbClr val="9999FF"/>
           </a:solidFill>
@@ -2648,12 +2724,12 @@
           <a:sym typeface="Helvetica"/>
         </a:defRPr>
       </a:lvl1pPr>
-      <a:lvl2pPr marL="1679575" marR="0" indent="-1543050" algn="l" defTabSz="4389437" rtl="0" latinLnBrk="0">
+      <a:lvl2pPr marL="1866160" marR="0" indent="-1714468" algn="l" defTabSz="4877060" rtl="0" latinLnBrk="0">
         <a:lnSpc>
           <a:spcPct val="100000"/>
         </a:lnSpc>
         <a:spcBef>
-          <a:spcPts val="1700"/>
+          <a:spcPts val="1889"/>
         </a:spcBef>
         <a:spcAft>
           <a:spcPts val="0"/>
@@ -2662,10 +2738,10 @@
         <a:buSzPct val="50000"/>
         <a:buFontTx/>
         <a:buBlip>
-          <a:blip r:embed="rId13"/>
+          <a:blip r:embed="rId12"/>
         </a:buBlip>
         <a:tabLst/>
-        <a:defRPr sz="7200" b="1" i="0" u="none" strike="noStrike" cap="none" spc="0" baseline="0">
+        <a:defRPr sz="8000" b="1" i="0" u="none" strike="noStrike" cap="none" spc="0" baseline="0">
           <a:solidFill>
             <a:srgbClr val="9999FF"/>
           </a:solidFill>
@@ -2676,12 +2752,12 @@
           <a:sym typeface="Helvetica"/>
         </a:defRPr>
       </a:lvl2pPr>
-      <a:lvl3pPr marL="6092113" marR="0" indent="-1702674" algn="l" defTabSz="4389437" rtl="0" latinLnBrk="0">
+      <a:lvl3pPr marL="6768887" marR="0" indent="-1891825" algn="l" defTabSz="4877060" rtl="0" latinLnBrk="0">
         <a:lnSpc>
           <a:spcPct val="100000"/>
         </a:lnSpc>
         <a:spcBef>
-          <a:spcPts val="1700"/>
+          <a:spcPts val="1889"/>
         </a:spcBef>
         <a:spcAft>
           <a:spcPts val="0"/>
@@ -2691,7 +2767,7 @@
         <a:buFontTx/>
         <a:buChar char="­"/>
         <a:tabLst/>
-        <a:defRPr sz="7200" b="1" i="0" u="none" strike="noStrike" cap="none" spc="0" baseline="0">
+        <a:defRPr sz="8000" b="1" i="0" u="none" strike="noStrike" cap="none" spc="0" baseline="0">
           <a:solidFill>
             <a:srgbClr val="9999FF"/>
           </a:solidFill>
@@ -2702,12 +2778,12 @@
           <a:sym typeface="Helvetica"/>
         </a:defRPr>
       </a:lvl3pPr>
-      <a:lvl4pPr marL="7951788" marR="0" indent="-1370013" algn="l" defTabSz="4389437" rtl="0" latinLnBrk="0">
+      <a:lvl4pPr marL="8835154" marR="0" indent="-1522208" algn="l" defTabSz="4877060" rtl="0" latinLnBrk="0">
         <a:lnSpc>
           <a:spcPct val="100000"/>
         </a:lnSpc>
         <a:spcBef>
-          <a:spcPts val="1700"/>
+          <a:spcPts val="1889"/>
         </a:spcBef>
         <a:spcAft>
           <a:spcPts val="0"/>
@@ -2716,10 +2792,10 @@
         <a:buSzPct val="50000"/>
         <a:buFontTx/>
         <a:buBlip>
-          <a:blip r:embed="rId13"/>
+          <a:blip r:embed="rId12"/>
         </a:buBlip>
         <a:tabLst/>
-        <a:defRPr sz="7200" b="1" i="0" u="none" strike="noStrike" cap="none" spc="0" baseline="0">
+        <a:defRPr sz="8000" b="1" i="0" u="none" strike="noStrike" cap="none" spc="0" baseline="0">
           <a:solidFill>
             <a:srgbClr val="9999FF"/>
           </a:solidFill>
@@ -2730,12 +2806,12 @@
           <a:sym typeface="Helvetica"/>
         </a:defRPr>
       </a:lvl4pPr>
-      <a:lvl5pPr marL="10148888" marR="0" indent="-1370013" algn="l" defTabSz="4389437" rtl="0" latinLnBrk="0">
+      <a:lvl5pPr marL="11276330" marR="0" indent="-1522208" algn="l" defTabSz="4877060" rtl="0" latinLnBrk="0">
         <a:lnSpc>
           <a:spcPct val="100000"/>
         </a:lnSpc>
         <a:spcBef>
-          <a:spcPts val="1700"/>
+          <a:spcPts val="1889"/>
         </a:spcBef>
         <a:spcAft>
           <a:spcPts val="0"/>
@@ -2744,10 +2820,10 @@
         <a:buSzPct val="50000"/>
         <a:buFontTx/>
         <a:buBlip>
-          <a:blip r:embed="rId13"/>
+          <a:blip r:embed="rId12"/>
         </a:buBlip>
         <a:tabLst/>
-        <a:defRPr sz="7200" b="1" i="0" u="none" strike="noStrike" cap="none" spc="0" baseline="0">
+        <a:defRPr sz="8000" b="1" i="0" u="none" strike="noStrike" cap="none" spc="0" baseline="0">
           <a:solidFill>
             <a:srgbClr val="9999FF"/>
           </a:solidFill>
@@ -2758,12 +2834,12 @@
           <a:sym typeface="Helvetica"/>
         </a:defRPr>
       </a:lvl5pPr>
-      <a:lvl6pPr marL="10606088" marR="0" indent="-1370013" algn="l" defTabSz="4389437" rtl="0" latinLnBrk="0">
+      <a:lvl6pPr marL="11784320" marR="0" indent="-1522208" algn="l" defTabSz="4877060" rtl="0" latinLnBrk="0">
         <a:lnSpc>
           <a:spcPct val="100000"/>
         </a:lnSpc>
         <a:spcBef>
-          <a:spcPts val="1700"/>
+          <a:spcPts val="1889"/>
         </a:spcBef>
         <a:spcAft>
           <a:spcPts val="0"/>
@@ -2772,10 +2848,10 @@
         <a:buSzPct val="50000"/>
         <a:buFontTx/>
         <a:buBlip>
-          <a:blip r:embed="rId13"/>
+          <a:blip r:embed="rId12"/>
         </a:buBlip>
         <a:tabLst/>
-        <a:defRPr sz="7200" b="1" i="0" u="none" strike="noStrike" cap="none" spc="0" baseline="0">
+        <a:defRPr sz="8000" b="1" i="0" u="none" strike="noStrike" cap="none" spc="0" baseline="0">
           <a:solidFill>
             <a:srgbClr val="9999FF"/>
           </a:solidFill>
@@ -2786,12 +2862,12 @@
           <a:sym typeface="Helvetica"/>
         </a:defRPr>
       </a:lvl6pPr>
-      <a:lvl7pPr marL="11063288" marR="0" indent="-1370013" algn="l" defTabSz="4389437" rtl="0" latinLnBrk="0">
+      <a:lvl7pPr marL="12292311" marR="0" indent="-1522208" algn="l" defTabSz="4877060" rtl="0" latinLnBrk="0">
         <a:lnSpc>
           <a:spcPct val="100000"/>
         </a:lnSpc>
         <a:spcBef>
-          <a:spcPts val="1700"/>
+          <a:spcPts val="1889"/>
         </a:spcBef>
         <a:spcAft>
           <a:spcPts val="0"/>
@@ -2800,10 +2876,10 @@
         <a:buSzPct val="50000"/>
         <a:buFontTx/>
         <a:buBlip>
-          <a:blip r:embed="rId13"/>
+          <a:blip r:embed="rId12"/>
         </a:buBlip>
         <a:tabLst/>
-        <a:defRPr sz="7200" b="1" i="0" u="none" strike="noStrike" cap="none" spc="0" baseline="0">
+        <a:defRPr sz="8000" b="1" i="0" u="none" strike="noStrike" cap="none" spc="0" baseline="0">
           <a:solidFill>
             <a:srgbClr val="9999FF"/>
           </a:solidFill>
@@ -2814,12 +2890,12 @@
           <a:sym typeface="Helvetica"/>
         </a:defRPr>
       </a:lvl7pPr>
-      <a:lvl8pPr marL="11520488" marR="0" indent="-1370013" algn="l" defTabSz="4389437" rtl="0" latinLnBrk="0">
+      <a:lvl8pPr marL="12800301" marR="0" indent="-1522208" algn="l" defTabSz="4877060" rtl="0" latinLnBrk="0">
         <a:lnSpc>
           <a:spcPct val="100000"/>
         </a:lnSpc>
         <a:spcBef>
-          <a:spcPts val="1700"/>
+          <a:spcPts val="1889"/>
         </a:spcBef>
         <a:spcAft>
           <a:spcPts val="0"/>
@@ -2828,10 +2904,10 @@
         <a:buSzPct val="50000"/>
         <a:buFontTx/>
         <a:buBlip>
-          <a:blip r:embed="rId13"/>
+          <a:blip r:embed="rId12"/>
         </a:buBlip>
         <a:tabLst/>
-        <a:defRPr sz="7200" b="1" i="0" u="none" strike="noStrike" cap="none" spc="0" baseline="0">
+        <a:defRPr sz="8000" b="1" i="0" u="none" strike="noStrike" cap="none" spc="0" baseline="0">
           <a:solidFill>
             <a:srgbClr val="9999FF"/>
           </a:solidFill>
@@ -2842,12 +2918,12 @@
           <a:sym typeface="Helvetica"/>
         </a:defRPr>
       </a:lvl8pPr>
-      <a:lvl9pPr marL="11977688" marR="0" indent="-1370013" algn="l" defTabSz="4389437" rtl="0" latinLnBrk="0">
+      <a:lvl9pPr marL="13308292" marR="0" indent="-1522208" algn="l" defTabSz="4877060" rtl="0" latinLnBrk="0">
         <a:lnSpc>
           <a:spcPct val="100000"/>
         </a:lnSpc>
         <a:spcBef>
-          <a:spcPts val="1700"/>
+          <a:spcPts val="1889"/>
         </a:spcBef>
         <a:spcAft>
           <a:spcPts val="0"/>
@@ -2856,10 +2932,10 @@
         <a:buSzPct val="50000"/>
         <a:buFontTx/>
         <a:buBlip>
-          <a:blip r:embed="rId13"/>
+          <a:blip r:embed="rId12"/>
         </a:buBlip>
         <a:tabLst/>
-        <a:defRPr sz="7200" b="1" i="0" u="none" strike="noStrike" cap="none" spc="0" baseline="0">
+        <a:defRPr sz="8000" b="1" i="0" u="none" strike="noStrike" cap="none" spc="0" baseline="0">
           <a:solidFill>
             <a:srgbClr val="9999FF"/>
           </a:solidFill>
@@ -2872,7 +2948,7 @@
       </a:lvl9pPr>
     </p:bodyStyle>
     <p:otherStyle>
-      <a:lvl1pPr marL="0" marR="0" indent="0" algn="r" defTabSz="914400" rtl="0" latinLnBrk="0">
+      <a:lvl1pPr marL="0" marR="0" indent="0" algn="r" defTabSz="1015981" rtl="0" latinLnBrk="0">
         <a:lnSpc>
           <a:spcPct val="100000"/>
         </a:lnSpc>
@@ -2887,7 +2963,7 @@
         <a:buFontTx/>
         <a:buNone/>
         <a:tabLst/>
-        <a:defRPr sz="1200" b="0" i="0" u="none" strike="noStrike" cap="none" spc="0" baseline="0">
+        <a:defRPr sz="1333" b="0" i="0" u="none" strike="noStrike" cap="none" spc="0" baseline="0">
           <a:solidFill>
             <a:schemeClr val="tx1"/>
           </a:solidFill>
@@ -2898,7 +2974,7 @@
           <a:sym typeface="Helvetica"/>
         </a:defRPr>
       </a:lvl1pPr>
-      <a:lvl2pPr marL="0" marR="0" indent="0" algn="r" defTabSz="914400" rtl="0" latinLnBrk="0">
+      <a:lvl2pPr marL="0" marR="0" indent="0" algn="r" defTabSz="1015981" rtl="0" latinLnBrk="0">
         <a:lnSpc>
           <a:spcPct val="100000"/>
         </a:lnSpc>
@@ -2913,7 +2989,7 @@
         <a:buFontTx/>
         <a:buNone/>
         <a:tabLst/>
-        <a:defRPr sz="1200" b="0" i="0" u="none" strike="noStrike" cap="none" spc="0" baseline="0">
+        <a:defRPr sz="1333" b="0" i="0" u="none" strike="noStrike" cap="none" spc="0" baseline="0">
           <a:solidFill>
             <a:schemeClr val="tx1"/>
           </a:solidFill>
@@ -2924,7 +3000,7 @@
           <a:sym typeface="Helvetica"/>
         </a:defRPr>
       </a:lvl2pPr>
-      <a:lvl3pPr marL="0" marR="0" indent="0" algn="r" defTabSz="914400" rtl="0" latinLnBrk="0">
+      <a:lvl3pPr marL="0" marR="0" indent="0" algn="r" defTabSz="1015981" rtl="0" latinLnBrk="0">
         <a:lnSpc>
           <a:spcPct val="100000"/>
         </a:lnSpc>
@@ -2939,7 +3015,7 @@
         <a:buFontTx/>
         <a:buNone/>
         <a:tabLst/>
-        <a:defRPr sz="1200" b="0" i="0" u="none" strike="noStrike" cap="none" spc="0" baseline="0">
+        <a:defRPr sz="1333" b="0" i="0" u="none" strike="noStrike" cap="none" spc="0" baseline="0">
           <a:solidFill>
             <a:schemeClr val="tx1"/>
           </a:solidFill>
@@ -2950,7 +3026,7 @@
           <a:sym typeface="Helvetica"/>
         </a:defRPr>
       </a:lvl3pPr>
-      <a:lvl4pPr marL="0" marR="0" indent="0" algn="r" defTabSz="914400" rtl="0" latinLnBrk="0">
+      <a:lvl4pPr marL="0" marR="0" indent="0" algn="r" defTabSz="1015981" rtl="0" latinLnBrk="0">
         <a:lnSpc>
           <a:spcPct val="100000"/>
         </a:lnSpc>
@@ -2965,7 +3041,7 @@
         <a:buFontTx/>
         <a:buNone/>
         <a:tabLst/>
-        <a:defRPr sz="1200" b="0" i="0" u="none" strike="noStrike" cap="none" spc="0" baseline="0">
+        <a:defRPr sz="1333" b="0" i="0" u="none" strike="noStrike" cap="none" spc="0" baseline="0">
           <a:solidFill>
             <a:schemeClr val="tx1"/>
           </a:solidFill>
@@ -2976,7 +3052,7 @@
           <a:sym typeface="Helvetica"/>
         </a:defRPr>
       </a:lvl4pPr>
-      <a:lvl5pPr marL="0" marR="0" indent="0" algn="r" defTabSz="914400" rtl="0" latinLnBrk="0">
+      <a:lvl5pPr marL="0" marR="0" indent="0" algn="r" defTabSz="1015981" rtl="0" latinLnBrk="0">
         <a:lnSpc>
           <a:spcPct val="100000"/>
         </a:lnSpc>
@@ -2991,7 +3067,7 @@
         <a:buFontTx/>
         <a:buNone/>
         <a:tabLst/>
-        <a:defRPr sz="1200" b="0" i="0" u="none" strike="noStrike" cap="none" spc="0" baseline="0">
+        <a:defRPr sz="1333" b="0" i="0" u="none" strike="noStrike" cap="none" spc="0" baseline="0">
           <a:solidFill>
             <a:schemeClr val="tx1"/>
           </a:solidFill>
@@ -3002,7 +3078,7 @@
           <a:sym typeface="Helvetica"/>
         </a:defRPr>
       </a:lvl5pPr>
-      <a:lvl6pPr marL="0" marR="0" indent="0" algn="r" defTabSz="914400" rtl="0" latinLnBrk="0">
+      <a:lvl6pPr marL="0" marR="0" indent="0" algn="r" defTabSz="1015981" rtl="0" latinLnBrk="0">
         <a:lnSpc>
           <a:spcPct val="100000"/>
         </a:lnSpc>
@@ -3017,7 +3093,7 @@
         <a:buFontTx/>
         <a:buNone/>
         <a:tabLst/>
-        <a:defRPr sz="1200" b="0" i="0" u="none" strike="noStrike" cap="none" spc="0" baseline="0">
+        <a:defRPr sz="1333" b="0" i="0" u="none" strike="noStrike" cap="none" spc="0" baseline="0">
           <a:solidFill>
             <a:schemeClr val="tx1"/>
           </a:solidFill>
@@ -3028,7 +3104,7 @@
           <a:sym typeface="Helvetica"/>
         </a:defRPr>
       </a:lvl6pPr>
-      <a:lvl7pPr marL="0" marR="0" indent="0" algn="r" defTabSz="914400" rtl="0" latinLnBrk="0">
+      <a:lvl7pPr marL="0" marR="0" indent="0" algn="r" defTabSz="1015981" rtl="0" latinLnBrk="0">
         <a:lnSpc>
           <a:spcPct val="100000"/>
         </a:lnSpc>
@@ -3043,7 +3119,7 @@
         <a:buFontTx/>
         <a:buNone/>
         <a:tabLst/>
-        <a:defRPr sz="1200" b="0" i="0" u="none" strike="noStrike" cap="none" spc="0" baseline="0">
+        <a:defRPr sz="1333" b="0" i="0" u="none" strike="noStrike" cap="none" spc="0" baseline="0">
           <a:solidFill>
             <a:schemeClr val="tx1"/>
           </a:solidFill>
@@ -3054,7 +3130,7 @@
           <a:sym typeface="Helvetica"/>
         </a:defRPr>
       </a:lvl7pPr>
-      <a:lvl8pPr marL="0" marR="0" indent="0" algn="r" defTabSz="914400" rtl="0" latinLnBrk="0">
+      <a:lvl8pPr marL="0" marR="0" indent="0" algn="r" defTabSz="1015981" rtl="0" latinLnBrk="0">
         <a:lnSpc>
           <a:spcPct val="100000"/>
         </a:lnSpc>
@@ -3069,7 +3145,7 @@
         <a:buFontTx/>
         <a:buNone/>
         <a:tabLst/>
-        <a:defRPr sz="1200" b="0" i="0" u="none" strike="noStrike" cap="none" spc="0" baseline="0">
+        <a:defRPr sz="1333" b="0" i="0" u="none" strike="noStrike" cap="none" spc="0" baseline="0">
           <a:solidFill>
             <a:schemeClr val="tx1"/>
           </a:solidFill>
@@ -3080,7 +3156,7 @@
           <a:sym typeface="Helvetica"/>
         </a:defRPr>
       </a:lvl8pPr>
-      <a:lvl9pPr marL="0" marR="0" indent="0" algn="r" defTabSz="914400" rtl="0" latinLnBrk="0">
+      <a:lvl9pPr marL="0" marR="0" indent="0" algn="r" defTabSz="1015981" rtl="0" latinLnBrk="0">
         <a:lnSpc>
           <a:spcPct val="100000"/>
         </a:lnSpc>
@@ -3095,7 +3171,7 @@
         <a:buFontTx/>
         <a:buNone/>
         <a:tabLst/>
-        <a:defRPr sz="1200" b="0" i="0" u="none" strike="noStrike" cap="none" spc="0" baseline="0">
+        <a:defRPr sz="1333" b="0" i="0" u="none" strike="noStrike" cap="none" spc="0" baseline="0">
           <a:solidFill>
             <a:schemeClr val="tx1"/>
           </a:solidFill>
@@ -3114,14 +3190,6 @@
 <file path=ppt/slides/slide1.xml><?xml version="1.0" encoding="utf-8"?>
 <p:sld xmlns:a="http://schemas.openxmlformats.org/drawingml/2006/main" xmlns:r="http://schemas.openxmlformats.org/officeDocument/2006/relationships" xmlns:p="http://schemas.openxmlformats.org/presentationml/2006/main">
   <p:cSld>
-    <p:bg>
-      <p:bgPr>
-        <a:solidFill>
-          <a:srgbClr val="0C2649"/>
-        </a:solidFill>
-        <a:effectLst/>
-      </p:bgPr>
-    </p:bg>
     <p:spTree>
       <p:nvGrpSpPr>
         <p:cNvPr id="1" name=""/>
@@ -3136,58 +3204,58 @@
           <a:chExt cx="0" cy="0"/>
         </a:xfrm>
       </p:grpSpPr>
-      <p:sp>
-        <p:nvSpPr>
-          <p:cNvPr id="112" name="Rectangle"/>
-          <p:cNvSpPr/>
+      <p:pic>
+        <p:nvPicPr>
+          <p:cNvPr id="4" name="Picture 3">
+            <a:extLst>
+              <a:ext uri="{FF2B5EF4-FFF2-40B4-BE49-F238E27FC236}">
+                <a16:creationId xmlns:a16="http://schemas.microsoft.com/office/drawing/2014/main" id="{84FAF2A7-57B1-98AF-3C31-895F4F687BB1}"/>
+              </a:ext>
+            </a:extLst>
+          </p:cNvPr>
+          <p:cNvPicPr>
+            <a:picLocks noChangeAspect="1"/>
+          </p:cNvPicPr>
           <p:nvPr/>
-        </p:nvSpPr>
+        </p:nvPicPr>
+        <p:blipFill>
+          <a:blip r:embed="rId2">
+            <a:extLst>
+              <a:ext uri="{28A0092B-C50C-407E-A947-70E740481C1C}">
+                <a14:useLocalDpi xmlns:a14="http://schemas.microsoft.com/office/drawing/2010/main" val="0"/>
+              </a:ext>
+            </a:extLst>
+          </a:blip>
+          <a:stretch>
+            <a:fillRect/>
+          </a:stretch>
+        </p:blipFill>
         <p:spPr>
           <a:xfrm>
-            <a:off x="-58889" y="4238974"/>
-            <a:ext cx="45812380" cy="28320148"/>
+            <a:off x="-72353" y="50039"/>
+            <a:ext cx="27600605" cy="4195276"/>
           </a:xfrm>
           <a:prstGeom prst="rect">
             <a:avLst/>
           </a:prstGeom>
-          <a:solidFill>
-            <a:srgbClr val="E7E6E6"/>
-          </a:solidFill>
-          <a:ln w="25400">
-            <a:solidFill>
-              <a:srgbClr val="2561AB"/>
-            </a:solidFill>
-          </a:ln>
         </p:spPr>
-        <p:txBody>
-          <a:bodyPr lIns="45718" tIns="45718" rIns="45718" bIns="45718" anchor="ctr"/>
-          <a:lstStyle/>
-          <a:p>
-            <a:pPr>
-              <a:defRPr>
-                <a:solidFill>
-                  <a:schemeClr val="accent2"/>
-                </a:solidFill>
-              </a:defRPr>
-            </a:pPr>
-            <a:endParaRPr lang="en-US" sz="8800" dirty="0">
-              <a:solidFill>
-                <a:srgbClr val="0D2549"/>
-              </a:solidFill>
-            </a:endParaRPr>
-          </a:p>
-        </p:txBody>
-      </p:sp>
+      </p:pic>
       <p:sp>
         <p:nvSpPr>
-          <p:cNvPr id="115" name="Rectangle 40"/>
+          <p:cNvPr id="5" name="Rectangle 40">
+            <a:extLst>
+              <a:ext uri="{FF2B5EF4-FFF2-40B4-BE49-F238E27FC236}">
+                <a16:creationId xmlns:a16="http://schemas.microsoft.com/office/drawing/2014/main" id="{0B970219-B7A4-425E-93A5-009575758B3E}"/>
+              </a:ext>
+            </a:extLst>
+          </p:cNvPr>
           <p:cNvSpPr txBox="1"/>
           <p:nvPr/>
         </p:nvSpPr>
         <p:spPr>
           <a:xfrm>
-            <a:off x="7366000" y="1078032"/>
-            <a:ext cx="30902889" cy="1446546"/>
+            <a:off x="904033" y="627554"/>
+            <a:ext cx="25792538" cy="1607295"/>
           </a:xfrm>
           <a:prstGeom prst="rect">
             <a:avLst/>
@@ -3197,12 +3265,12 @@
           </a:ln>
           <a:extLst>
             <a:ext uri="{C572A759-6A51-4108-AA02-DFA0A04FC94B}">
-              <ma14:wrappingTextBoxFlag xmlns:ma14="http://schemas.microsoft.com/office/mac/drawingml/2011/main" xmlns:a14="http://schemas.microsoft.com/office/drawing/2010/main" xmlns:m="http://schemas.openxmlformats.org/officeDocument/2006/math" xmlns="" val="1"/>
+              <ma14:wrappingTextBoxFlag xmlns="" xmlns:m="http://schemas.openxmlformats.org/officeDocument/2006/math" xmlns:a14="http://schemas.microsoft.com/office/drawing/2010/main" xmlns:ma14="http://schemas.microsoft.com/office/mac/drawingml/2011/main" val="1"/>
             </a:ext>
           </a:extLst>
         </p:spPr>
         <p:txBody>
-          <a:bodyPr wrap="square" lIns="45718" tIns="45718" rIns="45718" bIns="45718">
+          <a:bodyPr wrap="square" lIns="50798" tIns="50798" rIns="50798" bIns="50798">
             <a:spAutoFit/>
           </a:bodyPr>
           <a:lstStyle>
@@ -3217,23 +3285,29 @@
           </a:lstStyle>
           <a:p>
             <a:r>
-              <a:rPr lang="en-US" altLang="zh-CN" sz="8800" dirty="0"/>
+              <a:rPr lang="en-US" altLang="zh-CN" sz="9778" dirty="0"/>
               <a:t>Title</a:t>
             </a:r>
-            <a:endParaRPr sz="8800" dirty="0"/>
+            <a:endParaRPr sz="9778" dirty="0"/>
           </a:p>
         </p:txBody>
       </p:sp>
       <p:sp>
         <p:nvSpPr>
-          <p:cNvPr id="116" name="TextBox 41"/>
+          <p:cNvPr id="6" name="TextBox 41">
+            <a:extLst>
+              <a:ext uri="{FF2B5EF4-FFF2-40B4-BE49-F238E27FC236}">
+                <a16:creationId xmlns:a16="http://schemas.microsoft.com/office/drawing/2014/main" id="{0DAF1F72-6BC1-D77D-BE0A-95BCCEE05237}"/>
+              </a:ext>
+            </a:extLst>
+          </p:cNvPr>
           <p:cNvSpPr txBox="1"/>
           <p:nvPr/>
         </p:nvSpPr>
         <p:spPr>
           <a:xfrm>
-            <a:off x="5589272" y="2830640"/>
-            <a:ext cx="34585267" cy="892548"/>
+            <a:off x="-716984" y="2457295"/>
+            <a:ext cx="28865968" cy="991742"/>
           </a:xfrm>
           <a:prstGeom prst="rect">
             <a:avLst/>
@@ -3243,12 +3317,12 @@
           </a:ln>
           <a:extLst>
             <a:ext uri="{C572A759-6A51-4108-AA02-DFA0A04FC94B}">
-              <ma14:wrappingTextBoxFlag xmlns:ma14="http://schemas.microsoft.com/office/mac/drawingml/2011/main" xmlns:a14="http://schemas.microsoft.com/office/drawing/2010/main" xmlns:m="http://schemas.openxmlformats.org/officeDocument/2006/math" xmlns="" val="1"/>
+              <ma14:wrappingTextBoxFlag xmlns="" xmlns:m="http://schemas.openxmlformats.org/officeDocument/2006/math" xmlns:a14="http://schemas.microsoft.com/office/drawing/2010/main" xmlns:ma14="http://schemas.microsoft.com/office/mac/drawingml/2011/main" val="1"/>
             </a:ext>
           </a:extLst>
         </p:spPr>
         <p:txBody>
-          <a:bodyPr lIns="45718" tIns="45718" rIns="45718" bIns="45718" anchor="ctr">
+          <a:bodyPr wrap="square" lIns="50798" tIns="50798" rIns="50798" bIns="50798" anchor="ctr">
             <a:spAutoFit/>
           </a:bodyPr>
           <a:lstStyle>
@@ -3263,31 +3337,37 @@
           </a:lstStyle>
           <a:p>
             <a:r>
-              <a:rPr lang="en-US" dirty="0"/>
+              <a:rPr lang="en-US" sz="5778" dirty="0"/>
               <a:t>Team</a:t>
             </a:r>
-            <a:endParaRPr dirty="0"/>
+            <a:endParaRPr sz="5778" dirty="0"/>
           </a:p>
         </p:txBody>
       </p:sp>
       <p:pic>
         <p:nvPicPr>
-          <p:cNvPr id="117" name="u-m_logo-hex.png" descr="u-m_logo-hex.png"/>
+          <p:cNvPr id="7" name="u-m_logo-hex.png" descr="u-m_logo-hex.png">
+            <a:extLst>
+              <a:ext uri="{FF2B5EF4-FFF2-40B4-BE49-F238E27FC236}">
+                <a16:creationId xmlns:a16="http://schemas.microsoft.com/office/drawing/2014/main" id="{2620A9DD-9B22-0216-C14E-B9B8B2151B40}"/>
+              </a:ext>
+            </a:extLst>
+          </p:cNvPr>
           <p:cNvPicPr>
             <a:picLocks noChangeAspect="1"/>
           </p:cNvPicPr>
           <p:nvPr/>
         </p:nvPicPr>
         <p:blipFill>
-          <a:blip r:embed="rId2"/>
+          <a:blip r:embed="rId3"/>
           <a:stretch>
             <a:fillRect/>
           </a:stretch>
         </p:blipFill>
         <p:spPr>
           <a:xfrm>
-            <a:off x="355331" y="316484"/>
-            <a:ext cx="3591894" cy="3813546"/>
+            <a:off x="735429" y="627554"/>
+            <a:ext cx="2825918" cy="3000303"/>
           </a:xfrm>
           <a:prstGeom prst="rect">
             <a:avLst/>
@@ -3297,12 +3377,48 @@
           </a:ln>
         </p:spPr>
       </p:pic>
+      <p:pic>
+        <p:nvPicPr>
+          <p:cNvPr id="8" name="Picture 7">
+            <a:extLst>
+              <a:ext uri="{FF2B5EF4-FFF2-40B4-BE49-F238E27FC236}">
+                <a16:creationId xmlns:a16="http://schemas.microsoft.com/office/drawing/2014/main" id="{3DA34378-F40F-E10E-1E04-9925E7767B8F}"/>
+              </a:ext>
+            </a:extLst>
+          </p:cNvPr>
+          <p:cNvPicPr>
+            <a:picLocks noChangeAspect="1"/>
+          </p:cNvPicPr>
+          <p:nvPr/>
+        </p:nvPicPr>
+        <p:blipFill>
+          <a:blip r:embed="rId2">
+            <a:extLst>
+              <a:ext uri="{28A0092B-C50C-407E-A947-70E740481C1C}">
+                <a14:useLocalDpi xmlns:a14="http://schemas.microsoft.com/office/drawing/2010/main" val="0"/>
+              </a:ext>
+            </a:extLst>
+          </a:blip>
+          <a:stretch>
+            <a:fillRect/>
+          </a:stretch>
+        </p:blipFill>
+        <p:spPr>
+          <a:xfrm>
+            <a:off x="0" y="36101468"/>
+            <a:ext cx="27600605" cy="474532"/>
+          </a:xfrm>
+          <a:prstGeom prst="rect">
+            <a:avLst/>
+          </a:prstGeom>
+        </p:spPr>
+      </p:pic>
       <p:sp>
         <p:nvSpPr>
-          <p:cNvPr id="3" name="TextBox 2">
+          <p:cNvPr id="9" name="Rectangle 40">
             <a:extLst>
               <a:ext uri="{FF2B5EF4-FFF2-40B4-BE49-F238E27FC236}">
-                <a16:creationId xmlns:a16="http://schemas.microsoft.com/office/drawing/2014/main" id="{4C091C54-DA63-D3B1-F4D9-E88D84FAB7F4}"/>
+                <a16:creationId xmlns:a16="http://schemas.microsoft.com/office/drawing/2014/main" id="{CC980544-C04F-A357-9DFF-14E27700A4F1}"/>
               </a:ext>
             </a:extLst>
           </p:cNvPr>
@@ -3311,124 +3427,58 @@
         </p:nvSpPr>
         <p:spPr>
           <a:xfrm>
-            <a:off x="28719139" y="527752"/>
-            <a:ext cx="16238861" cy="584775"/>
+            <a:off x="819731" y="34999472"/>
+            <a:ext cx="25792538" cy="779697"/>
           </a:xfrm>
           <a:prstGeom prst="rect">
             <a:avLst/>
           </a:prstGeom>
-          <a:noFill/>
-          <a:ln w="12700" cap="flat">
-            <a:noFill/>
+          <a:ln w="12700">
             <a:miter lim="400000"/>
           </a:ln>
-          <a:effectLst/>
-          <a:sp3d/>
+          <a:extLst>
+            <a:ext uri="{C572A759-6A51-4108-AA02-DFA0A04FC94B}">
+              <ma14:wrappingTextBoxFlag xmlns="" xmlns:m="http://schemas.openxmlformats.org/officeDocument/2006/math" xmlns:a14="http://schemas.microsoft.com/office/drawing/2010/main" xmlns:ma14="http://schemas.microsoft.com/office/mac/drawingml/2011/main" val="1"/>
+            </a:ext>
+          </a:extLst>
         </p:spPr>
-        <p:style>
-          <a:lnRef idx="0">
-            <a:scrgbClr r="0" g="0" b="0"/>
-          </a:lnRef>
-          <a:fillRef idx="0">
-            <a:scrgbClr r="0" g="0" b="0"/>
-          </a:fillRef>
-          <a:effectRef idx="0">
-            <a:scrgbClr r="0" g="0" b="0"/>
-          </a:effectRef>
-          <a:fontRef idx="none"/>
-        </p:style>
         <p:txBody>
-          <a:bodyPr wrap="square">
+          <a:bodyPr wrap="square" lIns="50798" tIns="50798" rIns="50798" bIns="50798">
             <a:spAutoFit/>
           </a:bodyPr>
-          <a:lstStyle/>
-          <a:p>
-            <a:endParaRPr lang="en-US" dirty="0">
-              <a:solidFill>
-                <a:srgbClr val="0D2549"/>
-              </a:solidFill>
-            </a:endParaRPr>
-          </a:p>
-        </p:txBody>
-      </p:sp>
-      <p:sp>
-        <p:nvSpPr>
-          <p:cNvPr id="5" name="TextBox 4">
-            <a:extLst>
-              <a:ext uri="{FF2B5EF4-FFF2-40B4-BE49-F238E27FC236}">
-                <a16:creationId xmlns:a16="http://schemas.microsoft.com/office/drawing/2014/main" id="{69E8AD28-C2D0-CC04-F53A-CEC4E95F5F51}"/>
-              </a:ext>
-            </a:extLst>
-          </p:cNvPr>
-          <p:cNvSpPr txBox="1"/>
-          <p:nvPr/>
-        </p:nvSpPr>
-        <p:spPr>
-          <a:xfrm>
-            <a:off x="11362044" y="31293980"/>
-            <a:ext cx="22910800" cy="830997"/>
-          </a:xfrm>
-          <a:prstGeom prst="rect">
-            <a:avLst/>
-          </a:prstGeom>
-          <a:noFill/>
-          <a:ln w="12700" cap="flat">
-            <a:noFill/>
-            <a:miter lim="400000"/>
-          </a:ln>
-          <a:effectLst/>
-          <a:sp3d/>
-        </p:spPr>
-        <p:style>
-          <a:lnRef idx="0">
-            <a:scrgbClr r="0" g="0" b="0"/>
-          </a:lnRef>
-          <a:fillRef idx="0">
-            <a:scrgbClr r="0" g="0" b="0"/>
-          </a:fillRef>
-          <a:effectRef idx="0">
-            <a:scrgbClr r="0" g="0" b="0"/>
-          </a:effectRef>
-          <a:fontRef idx="none"/>
-        </p:style>
-        <p:txBody>
-          <a:bodyPr wrap="square">
-            <a:spAutoFit/>
-          </a:bodyPr>
-          <a:lstStyle/>
-          <a:p>
-            <a:pPr>
-              <a:defRPr>
+          <a:lstStyle>
+            <a:lvl1pPr>
+              <a:defRPr sz="8100">
+                <a:latin typeface="Gill Sans"/>
+                <a:ea typeface="Gill Sans"/>
+                <a:cs typeface="Gill Sans"/>
+                <a:sym typeface="Gill Sans"/>
+              </a:defRPr>
+            </a:lvl1pPr>
+          </a:lstStyle>
+          <a:p>
+            <a:r>
+              <a:rPr lang="en-US" altLang="zh-CN" sz="4400" dirty="0">
                 <a:solidFill>
-                  <a:schemeClr val="accent2"/>
-                </a:solidFill>
-              </a:defRPr>
-            </a:pPr>
-            <a:r>
-              <a:rPr lang="en-US" altLang="zh-CN" sz="4800" dirty="0">
-                <a:solidFill>
-                  <a:srgbClr val="0D2549"/>
+                  <a:srgbClr val="2F4C83"/>
                 </a:solidFill>
               </a:rPr>
-              <a:t>EECS 598 Systems for </a:t>
+              <a:t>EECS 598 004 Systems for Generative AI</a:t>
             </a:r>
-            <a:r>
-              <a:rPr lang="en-US" altLang="zh-CN" sz="4800" dirty="0" err="1">
-                <a:solidFill>
-                  <a:srgbClr val="0D2549"/>
-                </a:solidFill>
-              </a:rPr>
-              <a:t>GenAI</a:t>
-            </a:r>
-            <a:endParaRPr lang="en-US" sz="4800" dirty="0">
+            <a:endParaRPr lang="en-US" sz="4400" dirty="0">
               <a:solidFill>
-                <a:srgbClr val="0D2549"/>
+                <a:srgbClr val="2F4C83"/>
               </a:solidFill>
             </a:endParaRPr>
           </a:p>
         </p:txBody>
       </p:sp>
     </p:spTree>
+    <p:extLst>
+      <p:ext uri="{BB962C8B-B14F-4D97-AF65-F5344CB8AC3E}">
+        <p14:creationId xmlns:p14="http://schemas.microsoft.com/office/powerpoint/2010/main" val="3304634582"/>
+      </p:ext>
+    </p:extLst>
   </p:cSld>
   <p:clrMapOvr>
     <a:masterClrMapping/>
@@ -3440,42 +3490,42 @@
 <file path=ppt/theme/theme1.xml><?xml version="1.0" encoding="utf-8"?>
 <a:theme xmlns:a="http://schemas.openxmlformats.org/drawingml/2006/main" name="Default Design">
   <a:themeElements>
-    <a:clrScheme name="Default Design">
+    <a:clrScheme name="Office">
       <a:dk1>
-        <a:srgbClr val="FFFFFF"/>
+        <a:sysClr val="windowText" lastClr="000000"/>
       </a:dk1>
       <a:lt1>
-        <a:srgbClr val="FFFFFF"/>
+        <a:sysClr val="window" lastClr="FFFFFF"/>
       </a:lt1>
       <a:dk2>
-        <a:srgbClr val="A7A7A7"/>
+        <a:srgbClr val="44546A"/>
       </a:dk2>
       <a:lt2>
-        <a:srgbClr val="535353"/>
+        <a:srgbClr val="E7E6E6"/>
       </a:lt2>
       <a:accent1>
-        <a:srgbClr val="FF0000"/>
+        <a:srgbClr val="4472C4"/>
       </a:accent1>
       <a:accent2>
-        <a:srgbClr val="FFFF00"/>
+        <a:srgbClr val="ED7D31"/>
       </a:accent2>
       <a:accent3>
-        <a:srgbClr val="8F8F8F"/>
+        <a:srgbClr val="A5A5A5"/>
       </a:accent3>
       <a:accent4>
-        <a:srgbClr val="DADA00"/>
+        <a:srgbClr val="FFC000"/>
       </a:accent4>
       <a:accent5>
-        <a:srgbClr val="FFAAAA"/>
+        <a:srgbClr val="5B9BD5"/>
       </a:accent5>
       <a:accent6>
-        <a:srgbClr val="E7E700"/>
+        <a:srgbClr val="70AD47"/>
       </a:accent6>
       <a:hlink>
-        <a:srgbClr val="0000FF"/>
+        <a:srgbClr val="0563C1"/>
       </a:hlink>
       <a:folHlink>
-        <a:srgbClr val="FF00FF"/>
+        <a:srgbClr val="954F72"/>
       </a:folHlink>
     </a:clrScheme>
     <a:fontScheme name="Default Design">
@@ -5581,4 +5631,299 @@
   </a:objectDefaults>
   <a:extraClrSchemeLst/>
 </a:theme>
+</file>
+
+<file path=ppt/theme/theme3.xml><?xml version="1.0" encoding="utf-8"?>
+<a:theme xmlns:a="http://schemas.openxmlformats.org/drawingml/2006/main" name="Office Theme">
+  <a:themeElements>
+    <a:clrScheme name="Office">
+      <a:dk1>
+        <a:sysClr val="windowText" lastClr="000000"/>
+      </a:dk1>
+      <a:lt1>
+        <a:sysClr val="window" lastClr="FFFFFF"/>
+      </a:lt1>
+      <a:dk2>
+        <a:srgbClr val="44546A"/>
+      </a:dk2>
+      <a:lt2>
+        <a:srgbClr val="E7E6E6"/>
+      </a:lt2>
+      <a:accent1>
+        <a:srgbClr val="4472C4"/>
+      </a:accent1>
+      <a:accent2>
+        <a:srgbClr val="ED7D31"/>
+      </a:accent2>
+      <a:accent3>
+        <a:srgbClr val="A5A5A5"/>
+      </a:accent3>
+      <a:accent4>
+        <a:srgbClr val="FFC000"/>
+      </a:accent4>
+      <a:accent5>
+        <a:srgbClr val="5B9BD5"/>
+      </a:accent5>
+      <a:accent6>
+        <a:srgbClr val="70AD47"/>
+      </a:accent6>
+      <a:hlink>
+        <a:srgbClr val="0563C1"/>
+      </a:hlink>
+      <a:folHlink>
+        <a:srgbClr val="954F72"/>
+      </a:folHlink>
+    </a:clrScheme>
+    <a:fontScheme name="Office">
+      <a:majorFont>
+        <a:latin typeface="Calibri Light" panose="020F0302020204030204"/>
+        <a:ea typeface=""/>
+        <a:cs typeface=""/>
+        <a:font script="Jpan" typeface="游ゴシック Light"/>
+        <a:font script="Hang" typeface="맑은 고딕"/>
+        <a:font script="Hans" typeface="等线 Light"/>
+        <a:font script="Hant" typeface="新細明體"/>
+        <a:font script="Arab" typeface="Times New Roman"/>
+        <a:font script="Hebr" typeface="Times New Roman"/>
+        <a:font script="Thai" typeface="Angsana New"/>
+        <a:font script="Ethi" typeface="Nyala"/>
+        <a:font script="Beng" typeface="Vrinda"/>
+        <a:font script="Gujr" typeface="Shruti"/>
+        <a:font script="Khmr" typeface="MoolBoran"/>
+        <a:font script="Knda" typeface="Tunga"/>
+        <a:font script="Guru" typeface="Raavi"/>
+        <a:font script="Cans" typeface="Euphemia"/>
+        <a:font script="Cher" typeface="Plantagenet Cherokee"/>
+        <a:font script="Yiii" typeface="Microsoft Yi Baiti"/>
+        <a:font script="Tibt" typeface="Microsoft Himalaya"/>
+        <a:font script="Thaa" typeface="MV Boli"/>
+        <a:font script="Deva" typeface="Mangal"/>
+        <a:font script="Telu" typeface="Gautami"/>
+        <a:font script="Taml" typeface="Latha"/>
+        <a:font script="Syrc" typeface="Estrangelo Edessa"/>
+        <a:font script="Orya" typeface="Kalinga"/>
+        <a:font script="Mlym" typeface="Kartika"/>
+        <a:font script="Laoo" typeface="DokChampa"/>
+        <a:font script="Sinh" typeface="Iskoola Pota"/>
+        <a:font script="Mong" typeface="Mongolian Baiti"/>
+        <a:font script="Viet" typeface="Times New Roman"/>
+        <a:font script="Uigh" typeface="Microsoft Uighur"/>
+        <a:font script="Geor" typeface="Sylfaen"/>
+        <a:font script="Armn" typeface="Arial"/>
+        <a:font script="Bugi" typeface="Leelawadee UI"/>
+        <a:font script="Bopo" typeface="Microsoft JhengHei"/>
+        <a:font script="Java" typeface="Javanese Text"/>
+        <a:font script="Lisu" typeface="Segoe UI"/>
+        <a:font script="Mymr" typeface="Myanmar Text"/>
+        <a:font script="Nkoo" typeface="Ebrima"/>
+        <a:font script="Olck" typeface="Nirmala UI"/>
+        <a:font script="Osma" typeface="Ebrima"/>
+        <a:font script="Phag" typeface="Phagspa"/>
+        <a:font script="Syrn" typeface="Estrangelo Edessa"/>
+        <a:font script="Syrj" typeface="Estrangelo Edessa"/>
+        <a:font script="Syre" typeface="Estrangelo Edessa"/>
+        <a:font script="Sora" typeface="Nirmala UI"/>
+        <a:font script="Tale" typeface="Microsoft Tai Le"/>
+        <a:font script="Talu" typeface="Microsoft New Tai Lue"/>
+        <a:font script="Tfng" typeface="Ebrima"/>
+      </a:majorFont>
+      <a:minorFont>
+        <a:latin typeface="Calibri" panose="020F0502020204030204"/>
+        <a:ea typeface=""/>
+        <a:cs typeface=""/>
+        <a:font script="Jpan" typeface="游ゴシック"/>
+        <a:font script="Hang" typeface="맑은 고딕"/>
+        <a:font script="Hans" typeface="等线"/>
+        <a:font script="Hant" typeface="新細明體"/>
+        <a:font script="Arab" typeface="Arial"/>
+        <a:font script="Hebr" typeface="Arial"/>
+        <a:font script="Thai" typeface="Cordia New"/>
+        <a:font script="Ethi" typeface="Nyala"/>
+        <a:font script="Beng" typeface="Vrinda"/>
+        <a:font script="Gujr" typeface="Shruti"/>
+        <a:font script="Khmr" typeface="DaunPenh"/>
+        <a:font script="Knda" typeface="Tunga"/>
+        <a:font script="Guru" typeface="Raavi"/>
+        <a:font script="Cans" typeface="Euphemia"/>
+        <a:font script="Cher" typeface="Plantagenet Cherokee"/>
+        <a:font script="Yiii" typeface="Microsoft Yi Baiti"/>
+        <a:font script="Tibt" typeface="Microsoft Himalaya"/>
+        <a:font script="Thaa" typeface="MV Boli"/>
+        <a:font script="Deva" typeface="Mangal"/>
+        <a:font script="Telu" typeface="Gautami"/>
+        <a:font script="Taml" typeface="Latha"/>
+        <a:font script="Syrc" typeface="Estrangelo Edessa"/>
+        <a:font script="Orya" typeface="Kalinga"/>
+        <a:font script="Mlym" typeface="Kartika"/>
+        <a:font script="Laoo" typeface="DokChampa"/>
+        <a:font script="Sinh" typeface="Iskoola Pota"/>
+        <a:font script="Mong" typeface="Mongolian Baiti"/>
+        <a:font script="Viet" typeface="Arial"/>
+        <a:font script="Uigh" typeface="Microsoft Uighur"/>
+        <a:font script="Geor" typeface="Sylfaen"/>
+        <a:font script="Armn" typeface="Arial"/>
+        <a:font script="Bugi" typeface="Leelawadee UI"/>
+        <a:font script="Bopo" typeface="Microsoft JhengHei"/>
+        <a:font script="Java" typeface="Javanese Text"/>
+        <a:font script="Lisu" typeface="Segoe UI"/>
+        <a:font script="Mymr" typeface="Myanmar Text"/>
+        <a:font script="Nkoo" typeface="Ebrima"/>
+        <a:font script="Olck" typeface="Nirmala UI"/>
+        <a:font script="Osma" typeface="Ebrima"/>
+        <a:font script="Phag" typeface="Phagspa"/>
+        <a:font script="Syrn" typeface="Estrangelo Edessa"/>
+        <a:font script="Syrj" typeface="Estrangelo Edessa"/>
+        <a:font script="Syre" typeface="Estrangelo Edessa"/>
+        <a:font script="Sora" typeface="Nirmala UI"/>
+        <a:font script="Tale" typeface="Microsoft Tai Le"/>
+        <a:font script="Talu" typeface="Microsoft New Tai Lue"/>
+        <a:font script="Tfng" typeface="Ebrima"/>
+      </a:minorFont>
+    </a:fontScheme>
+    <a:fmtScheme name="Office">
+      <a:fillStyleLst>
+        <a:solidFill>
+          <a:schemeClr val="phClr"/>
+        </a:solidFill>
+        <a:gradFill rotWithShape="1">
+          <a:gsLst>
+            <a:gs pos="0">
+              <a:schemeClr val="phClr">
+                <a:lumMod val="110000"/>
+                <a:satMod val="105000"/>
+                <a:tint val="67000"/>
+              </a:schemeClr>
+            </a:gs>
+            <a:gs pos="50000">
+              <a:schemeClr val="phClr">
+                <a:lumMod val="105000"/>
+                <a:satMod val="103000"/>
+                <a:tint val="73000"/>
+              </a:schemeClr>
+            </a:gs>
+            <a:gs pos="100000">
+              <a:schemeClr val="phClr">
+                <a:lumMod val="105000"/>
+                <a:satMod val="109000"/>
+                <a:tint val="81000"/>
+              </a:schemeClr>
+            </a:gs>
+          </a:gsLst>
+          <a:lin ang="5400000" scaled="0"/>
+        </a:gradFill>
+        <a:gradFill rotWithShape="1">
+          <a:gsLst>
+            <a:gs pos="0">
+              <a:schemeClr val="phClr">
+                <a:satMod val="103000"/>
+                <a:lumMod val="102000"/>
+                <a:tint val="94000"/>
+              </a:schemeClr>
+            </a:gs>
+            <a:gs pos="50000">
+              <a:schemeClr val="phClr">
+                <a:satMod val="110000"/>
+                <a:lumMod val="100000"/>
+                <a:shade val="100000"/>
+              </a:schemeClr>
+            </a:gs>
+            <a:gs pos="100000">
+              <a:schemeClr val="phClr">
+                <a:lumMod val="99000"/>
+                <a:satMod val="120000"/>
+                <a:shade val="78000"/>
+              </a:schemeClr>
+            </a:gs>
+          </a:gsLst>
+          <a:lin ang="5400000" scaled="0"/>
+        </a:gradFill>
+      </a:fillStyleLst>
+      <a:lnStyleLst>
+        <a:ln w="6350" cap="flat" cmpd="sng" algn="ctr">
+          <a:solidFill>
+            <a:schemeClr val="phClr"/>
+          </a:solidFill>
+          <a:prstDash val="solid"/>
+          <a:miter lim="800000"/>
+        </a:ln>
+        <a:ln w="12700" cap="flat" cmpd="sng" algn="ctr">
+          <a:solidFill>
+            <a:schemeClr val="phClr"/>
+          </a:solidFill>
+          <a:prstDash val="solid"/>
+          <a:miter lim="800000"/>
+        </a:ln>
+        <a:ln w="19050" cap="flat" cmpd="sng" algn="ctr">
+          <a:solidFill>
+            <a:schemeClr val="phClr"/>
+          </a:solidFill>
+          <a:prstDash val="solid"/>
+          <a:miter lim="800000"/>
+        </a:ln>
+      </a:lnStyleLst>
+      <a:effectStyleLst>
+        <a:effectStyle>
+          <a:effectLst/>
+        </a:effectStyle>
+        <a:effectStyle>
+          <a:effectLst/>
+        </a:effectStyle>
+        <a:effectStyle>
+          <a:effectLst>
+            <a:outerShdw blurRad="57150" dist="19050" dir="5400000" algn="ctr" rotWithShape="0">
+              <a:srgbClr val="000000">
+                <a:alpha val="63000"/>
+              </a:srgbClr>
+            </a:outerShdw>
+          </a:effectLst>
+        </a:effectStyle>
+      </a:effectStyleLst>
+      <a:bgFillStyleLst>
+        <a:solidFill>
+          <a:schemeClr val="phClr"/>
+        </a:solidFill>
+        <a:solidFill>
+          <a:schemeClr val="phClr">
+            <a:tint val="95000"/>
+            <a:satMod val="170000"/>
+          </a:schemeClr>
+        </a:solidFill>
+        <a:gradFill rotWithShape="1">
+          <a:gsLst>
+            <a:gs pos="0">
+              <a:schemeClr val="phClr">
+                <a:tint val="93000"/>
+                <a:satMod val="150000"/>
+                <a:shade val="98000"/>
+                <a:lumMod val="102000"/>
+              </a:schemeClr>
+            </a:gs>
+            <a:gs pos="50000">
+              <a:schemeClr val="phClr">
+                <a:tint val="98000"/>
+                <a:satMod val="130000"/>
+                <a:shade val="90000"/>
+                <a:lumMod val="103000"/>
+              </a:schemeClr>
+            </a:gs>
+            <a:gs pos="100000">
+              <a:schemeClr val="phClr">
+                <a:shade val="63000"/>
+                <a:satMod val="120000"/>
+              </a:schemeClr>
+            </a:gs>
+          </a:gsLst>
+          <a:lin ang="5400000" scaled="0"/>
+        </a:gradFill>
+      </a:bgFillStyleLst>
+    </a:fmtScheme>
+  </a:themeElements>
+  <a:objectDefaults/>
+  <a:extraClrSchemeLst/>
+  <a:extLst>
+    <a:ext uri="{05A4C25C-085E-4340-85A3-A5531E510DB2}">
+      <thm15:themeFamily xmlns:thm15="http://schemas.microsoft.com/office/thememl/2012/main" name="Office Theme" id="{62F939B6-93AF-4DB8-9C6B-D6C7DFDC589F}" vid="{4A3C46E8-61CC-4603-A589-7422A47A8E4A}"/>
+    </a:ext>
+  </a:extLst>
+</a:theme>
 </file>
</xml_diff>